<commit_message>
Remove white outlines from all lab icons
</commit_message>
<xml_diff>
--- a/doc/icons/Icons-PasteLab.pptx
+++ b/doc/icons/Icons-PasteLab.pptx
@@ -221,7 +221,7 @@
           <a:p>
             <a:fld id="{6699ACB9-486C-4D62-A3A7-AF98E13EFDA3}" type="datetimeFigureOut">
               <a:rPr lang="en-US" smtClean="0"/>
-              <a:t>6/13/2017</a:t>
+              <a:t>7/6/2017</a:t>
             </a:fld>
             <a:endParaRPr lang="en-US"/>
           </a:p>
@@ -752,7 +752,7 @@
             <a:fld id="{1D8BD707-D9CF-40AE-B4C6-C98DA3205C09}" type="datetimeFigureOut">
               <a:rPr lang="en-US" smtClean="0"/>
               <a:pPr/>
-              <a:t>6/13/2017</a:t>
+              <a:t>7/6/2017</a:t>
             </a:fld>
             <a:endParaRPr lang="en-US"/>
           </a:p>
@@ -917,7 +917,7 @@
             <a:fld id="{1D8BD707-D9CF-40AE-B4C6-C98DA3205C09}" type="datetimeFigureOut">
               <a:rPr lang="en-US" smtClean="0"/>
               <a:pPr/>
-              <a:t>6/13/2017</a:t>
+              <a:t>7/6/2017</a:t>
             </a:fld>
             <a:endParaRPr lang="en-US"/>
           </a:p>
@@ -1092,7 +1092,7 @@
             <a:fld id="{1D8BD707-D9CF-40AE-B4C6-C98DA3205C09}" type="datetimeFigureOut">
               <a:rPr lang="en-US" smtClean="0"/>
               <a:pPr/>
-              <a:t>6/13/2017</a:t>
+              <a:t>7/6/2017</a:t>
             </a:fld>
             <a:endParaRPr lang="en-US"/>
           </a:p>
@@ -1257,7 +1257,7 @@
             <a:fld id="{1D8BD707-D9CF-40AE-B4C6-C98DA3205C09}" type="datetimeFigureOut">
               <a:rPr lang="en-US" smtClean="0"/>
               <a:pPr/>
-              <a:t>6/13/2017</a:t>
+              <a:t>7/6/2017</a:t>
             </a:fld>
             <a:endParaRPr lang="en-US"/>
           </a:p>
@@ -1499,7 +1499,7 @@
             <a:fld id="{1D8BD707-D9CF-40AE-B4C6-C98DA3205C09}" type="datetimeFigureOut">
               <a:rPr lang="en-US" smtClean="0"/>
               <a:pPr/>
-              <a:t>6/13/2017</a:t>
+              <a:t>7/6/2017</a:t>
             </a:fld>
             <a:endParaRPr lang="en-US"/>
           </a:p>
@@ -1781,7 +1781,7 @@
             <a:fld id="{1D8BD707-D9CF-40AE-B4C6-C98DA3205C09}" type="datetimeFigureOut">
               <a:rPr lang="en-US" smtClean="0"/>
               <a:pPr/>
-              <a:t>6/13/2017</a:t>
+              <a:t>7/6/2017</a:t>
             </a:fld>
             <a:endParaRPr lang="en-US"/>
           </a:p>
@@ -2197,7 +2197,7 @@
             <a:fld id="{1D8BD707-D9CF-40AE-B4C6-C98DA3205C09}" type="datetimeFigureOut">
               <a:rPr lang="en-US" smtClean="0"/>
               <a:pPr/>
-              <a:t>6/13/2017</a:t>
+              <a:t>7/6/2017</a:t>
             </a:fld>
             <a:endParaRPr lang="en-US"/>
           </a:p>
@@ -2311,7 +2311,7 @@
             <a:fld id="{1D8BD707-D9CF-40AE-B4C6-C98DA3205C09}" type="datetimeFigureOut">
               <a:rPr lang="en-US" smtClean="0"/>
               <a:pPr/>
-              <a:t>6/13/2017</a:t>
+              <a:t>7/6/2017</a:t>
             </a:fld>
             <a:endParaRPr lang="en-US"/>
           </a:p>
@@ -2403,7 +2403,7 @@
             <a:fld id="{1D8BD707-D9CF-40AE-B4C6-C98DA3205C09}" type="datetimeFigureOut">
               <a:rPr lang="en-US" smtClean="0"/>
               <a:pPr/>
-              <a:t>6/13/2017</a:t>
+              <a:t>7/6/2017</a:t>
             </a:fld>
             <a:endParaRPr lang="en-US"/>
           </a:p>
@@ -2675,7 +2675,7 @@
             <a:fld id="{1D8BD707-D9CF-40AE-B4C6-C98DA3205C09}" type="datetimeFigureOut">
               <a:rPr lang="en-US" smtClean="0"/>
               <a:pPr/>
-              <a:t>6/13/2017</a:t>
+              <a:t>7/6/2017</a:t>
             </a:fld>
             <a:endParaRPr lang="en-US"/>
           </a:p>
@@ -2924,7 +2924,7 @@
             <a:fld id="{1D8BD707-D9CF-40AE-B4C6-C98DA3205C09}" type="datetimeFigureOut">
               <a:rPr lang="en-US" smtClean="0"/>
               <a:pPr/>
-              <a:t>6/13/2017</a:t>
+              <a:t>7/6/2017</a:t>
             </a:fld>
             <a:endParaRPr lang="en-US"/>
           </a:p>
@@ -3132,7 +3132,7 @@
             <a:fld id="{1D8BD707-D9CF-40AE-B4C6-C98DA3205C09}" type="datetimeFigureOut">
               <a:rPr lang="en-US" smtClean="0"/>
               <a:pPr/>
-              <a:t>6/13/2017</a:t>
+              <a:t>7/6/2017</a:t>
             </a:fld>
             <a:endParaRPr lang="en-US"/>
           </a:p>
@@ -4144,875 +4144,6 @@
           </a:p>
         </p:txBody>
       </p:sp>
-      <p:grpSp>
-        <p:nvGrpSpPr>
-          <p:cNvPr id="2" name="Group 1"/>
-          <p:cNvGrpSpPr/>
-          <p:nvPr/>
-        </p:nvGrpSpPr>
-        <p:grpSpPr>
-          <a:xfrm>
-            <a:off x="931555" y="1414827"/>
-            <a:ext cx="838200" cy="838200"/>
-            <a:chOff x="931555" y="1414827"/>
-            <a:chExt cx="838200" cy="838200"/>
-          </a:xfrm>
-        </p:grpSpPr>
-        <p:grpSp>
-          <p:nvGrpSpPr>
-            <p:cNvPr id="150" name="Group 149"/>
-            <p:cNvGrpSpPr/>
-            <p:nvPr/>
-          </p:nvGrpSpPr>
-          <p:grpSpPr>
-            <a:xfrm>
-              <a:off x="931555" y="1414827"/>
-              <a:ext cx="838200" cy="838200"/>
-              <a:chOff x="1002575" y="1231726"/>
-              <a:chExt cx="838200" cy="838200"/>
-            </a:xfrm>
-          </p:grpSpPr>
-          <p:sp>
-            <p:nvSpPr>
-              <p:cNvPr id="151" name="Rectangle 150"/>
-              <p:cNvSpPr/>
-              <p:nvPr/>
-            </p:nvSpPr>
-            <p:spPr>
-              <a:xfrm>
-                <a:off x="1002575" y="1231726"/>
-                <a:ext cx="838200" cy="838200"/>
-              </a:xfrm>
-              <a:prstGeom prst="rect">
-                <a:avLst/>
-              </a:prstGeom>
-              <a:noFill/>
-              <a:ln>
-                <a:noFill/>
-              </a:ln>
-            </p:spPr>
-            <p:style>
-              <a:lnRef idx="2">
-                <a:schemeClr val="accent1">
-                  <a:shade val="50000"/>
-                </a:schemeClr>
-              </a:lnRef>
-              <a:fillRef idx="1">
-                <a:schemeClr val="accent1"/>
-              </a:fillRef>
-              <a:effectRef idx="0">
-                <a:schemeClr val="accent1"/>
-              </a:effectRef>
-              <a:fontRef idx="minor">
-                <a:schemeClr val="lt1"/>
-              </a:fontRef>
-            </p:style>
-            <p:txBody>
-              <a:bodyPr rtlCol="0" anchor="ctr"/>
-              <a:lstStyle/>
-              <a:p>
-                <a:pPr algn="ctr"/>
-                <a:endParaRPr lang="en-SG"/>
-              </a:p>
-            </p:txBody>
-          </p:sp>
-          <p:sp>
-            <p:nvSpPr>
-              <p:cNvPr id="152" name="Rectangle 4"/>
-              <p:cNvSpPr/>
-              <p:nvPr/>
-            </p:nvSpPr>
-            <p:spPr>
-              <a:xfrm rot="16200000">
-                <a:off x="1071530" y="1304929"/>
-                <a:ext cx="700291" cy="690781"/>
-              </a:xfrm>
-              <a:custGeom>
-                <a:avLst/>
-                <a:gdLst/>
-                <a:ahLst/>
-                <a:cxnLst/>
-                <a:rect l="l" t="t" r="r" b="b"/>
-                <a:pathLst>
-                  <a:path w="1752603" h="1752600">
-                    <a:moveTo>
-                      <a:pt x="533400" y="0"/>
-                    </a:moveTo>
-                    <a:lnTo>
-                      <a:pt x="533403" y="0"/>
-                    </a:lnTo>
-                    <a:lnTo>
-                      <a:pt x="1066800" y="0"/>
-                    </a:lnTo>
-                    <a:lnTo>
-                      <a:pt x="1752603" y="0"/>
-                    </a:lnTo>
-                    <a:lnTo>
-                      <a:pt x="1752603" y="1752600"/>
-                    </a:lnTo>
-                    <a:lnTo>
-                      <a:pt x="1219203" y="1752600"/>
-                    </a:lnTo>
-                    <a:lnTo>
-                      <a:pt x="533403" y="1752600"/>
-                    </a:lnTo>
-                    <a:lnTo>
-                      <a:pt x="3" y="1752600"/>
-                    </a:lnTo>
-                    <a:lnTo>
-                      <a:pt x="3" y="533430"/>
-                    </a:lnTo>
-                    <a:cubicBezTo>
-                      <a:pt x="0" y="533420"/>
-                      <a:pt x="0" y="533410"/>
-                      <a:pt x="0" y="533400"/>
-                    </a:cubicBezTo>
-                    <a:cubicBezTo>
-                      <a:pt x="0" y="238811"/>
-                      <a:pt x="238811" y="0"/>
-                      <a:pt x="533400" y="0"/>
-                    </a:cubicBezTo>
-                    <a:close/>
-                  </a:path>
-                </a:pathLst>
-              </a:custGeom>
-              <a:noFill/>
-              <a:ln w="76200" cmpd="sng">
-                <a:solidFill>
-                  <a:srgbClr val="0070C0"/>
-                </a:solidFill>
-                <a:miter lim="800000"/>
-              </a:ln>
-            </p:spPr>
-            <p:style>
-              <a:lnRef idx="2">
-                <a:schemeClr val="accent1">
-                  <a:shade val="50000"/>
-                </a:schemeClr>
-              </a:lnRef>
-              <a:fillRef idx="1">
-                <a:schemeClr val="accent1"/>
-              </a:fillRef>
-              <a:effectRef idx="0">
-                <a:schemeClr val="accent1"/>
-              </a:effectRef>
-              <a:fontRef idx="minor">
-                <a:schemeClr val="lt1"/>
-              </a:fontRef>
-            </p:style>
-            <p:txBody>
-              <a:bodyPr rtlCol="0" anchor="ctr"/>
-              <a:lstStyle/>
-              <a:p>
-                <a:pPr algn="ctr"/>
-                <a:endParaRPr lang="en-US"/>
-              </a:p>
-            </p:txBody>
-          </p:sp>
-        </p:grpSp>
-        <p:grpSp>
-          <p:nvGrpSpPr>
-            <p:cNvPr id="114" name="Group 113"/>
-            <p:cNvGrpSpPr/>
-            <p:nvPr/>
-          </p:nvGrpSpPr>
-          <p:grpSpPr>
-            <a:xfrm>
-              <a:off x="1076119" y="1552453"/>
-              <a:ext cx="549071" cy="549822"/>
-              <a:chOff x="4180111" y="1375544"/>
-              <a:chExt cx="549071" cy="549822"/>
-            </a:xfrm>
-          </p:grpSpPr>
-          <p:grpSp>
-            <p:nvGrpSpPr>
-              <p:cNvPr id="119" name="Group 118"/>
-              <p:cNvGrpSpPr/>
-              <p:nvPr/>
-            </p:nvGrpSpPr>
-            <p:grpSpPr>
-              <a:xfrm>
-                <a:off x="4235574" y="1385216"/>
-                <a:ext cx="446467" cy="521728"/>
-                <a:chOff x="4821567" y="919204"/>
-                <a:chExt cx="446467" cy="521728"/>
-              </a:xfrm>
-            </p:grpSpPr>
-            <p:sp>
-              <p:nvSpPr>
-                <p:cNvPr id="121" name="Rectangle 120"/>
-                <p:cNvSpPr/>
-                <p:nvPr/>
-              </p:nvSpPr>
-              <p:spPr>
-                <a:xfrm>
-                  <a:off x="4821567" y="971454"/>
-                  <a:ext cx="343904" cy="406070"/>
-                </a:xfrm>
-                <a:prstGeom prst="rect">
-                  <a:avLst/>
-                </a:prstGeom>
-                <a:solidFill>
-                  <a:srgbClr val="F79646"/>
-                </a:solidFill>
-                <a:ln>
-                  <a:noFill/>
-                </a:ln>
-              </p:spPr>
-              <p:style>
-                <a:lnRef idx="2">
-                  <a:schemeClr val="accent1">
-                    <a:shade val="50000"/>
-                  </a:schemeClr>
-                </a:lnRef>
-                <a:fillRef idx="1">
-                  <a:schemeClr val="accent1"/>
-                </a:fillRef>
-                <a:effectRef idx="0">
-                  <a:schemeClr val="accent1"/>
-                </a:effectRef>
-                <a:fontRef idx="minor">
-                  <a:schemeClr val="lt1"/>
-                </a:fontRef>
-              </p:style>
-              <p:txBody>
-                <a:bodyPr rtlCol="0" anchor="ctr"/>
-                <a:lstStyle/>
-                <a:p>
-                  <a:pPr algn="ctr"/>
-                  <a:endParaRPr lang="en-US"/>
-                </a:p>
-              </p:txBody>
-            </p:sp>
-            <p:sp>
-              <p:nvSpPr>
-                <p:cNvPr id="122" name="Rectangle: Folded Corner 121"/>
-                <p:cNvSpPr/>
-                <p:nvPr/>
-              </p:nvSpPr>
-              <p:spPr>
-                <a:xfrm rot="10800000" flipH="1">
-                  <a:off x="4990894" y="1102754"/>
-                  <a:ext cx="277140" cy="338178"/>
-                </a:xfrm>
-                <a:prstGeom prst="foldedCorner">
-                  <a:avLst>
-                    <a:gd name="adj" fmla="val 44103"/>
-                  </a:avLst>
-                </a:prstGeom>
-                <a:solidFill>
-                  <a:srgbClr val="0070C0"/>
-                </a:solidFill>
-                <a:ln w="19050">
-                  <a:solidFill>
-                    <a:schemeClr val="bg1"/>
-                  </a:solidFill>
-                </a:ln>
-              </p:spPr>
-              <p:style>
-                <a:lnRef idx="2">
-                  <a:schemeClr val="accent1">
-                    <a:shade val="50000"/>
-                  </a:schemeClr>
-                </a:lnRef>
-                <a:fillRef idx="1">
-                  <a:schemeClr val="accent1"/>
-                </a:fillRef>
-                <a:effectRef idx="0">
-                  <a:schemeClr val="accent1"/>
-                </a:effectRef>
-                <a:fontRef idx="minor">
-                  <a:schemeClr val="lt1"/>
-                </a:fontRef>
-              </p:style>
-              <p:txBody>
-                <a:bodyPr rtlCol="0" anchor="ctr"/>
-                <a:lstStyle/>
-                <a:p>
-                  <a:pPr algn="ctr"/>
-                  <a:endParaRPr lang="en-US" dirty="0"/>
-                </a:p>
-              </p:txBody>
-            </p:sp>
-            <p:sp>
-              <p:nvSpPr>
-                <p:cNvPr id="123" name="Rounded Rectangle 227"/>
-                <p:cNvSpPr/>
-                <p:nvPr/>
-              </p:nvSpPr>
-              <p:spPr>
-                <a:xfrm rot="10800000">
-                  <a:off x="4879960" y="919204"/>
-                  <a:ext cx="234247" cy="101171"/>
-                </a:xfrm>
-                <a:custGeom>
-                  <a:avLst/>
-                  <a:gdLst/>
-                  <a:ahLst/>
-                  <a:cxnLst/>
-                  <a:rect l="l" t="t" r="r" b="b"/>
-                  <a:pathLst>
-                    <a:path w="286327" h="1000124">
-                      <a:moveTo>
-                        <a:pt x="2115" y="0"/>
-                      </a:moveTo>
-                      <a:lnTo>
-                        <a:pt x="284212" y="0"/>
-                      </a:lnTo>
-                      <a:cubicBezTo>
-                        <a:pt x="286188" y="3367"/>
-                        <a:pt x="286327" y="6905"/>
-                        <a:pt x="286327" y="10476"/>
-                      </a:cubicBezTo>
-                      <a:lnTo>
-                        <a:pt x="286327" y="712825"/>
-                      </a:lnTo>
-                      <a:cubicBezTo>
-                        <a:pt x="286327" y="772047"/>
-                        <a:pt x="247915" y="822299"/>
-                        <a:pt x="194109" y="838409"/>
-                      </a:cubicBezTo>
-                      <a:cubicBezTo>
-                        <a:pt x="194108" y="875332"/>
-                        <a:pt x="194108" y="912256"/>
-                        <a:pt x="194108" y="949179"/>
-                      </a:cubicBezTo>
-                      <a:cubicBezTo>
-                        <a:pt x="194108" y="977315"/>
-                        <a:pt x="171299" y="1000124"/>
-                        <a:pt x="143163" y="1000124"/>
-                      </a:cubicBezTo>
-                      <a:lnTo>
-                        <a:pt x="143164" y="1000123"/>
-                      </a:lnTo>
-                      <a:cubicBezTo>
-                        <a:pt x="115028" y="1000123"/>
-                        <a:pt x="92219" y="977314"/>
-                        <a:pt x="92219" y="949178"/>
-                      </a:cubicBezTo>
-                      <a:lnTo>
-                        <a:pt x="92219" y="838409"/>
-                      </a:lnTo>
-                      <a:cubicBezTo>
-                        <a:pt x="38413" y="822299"/>
-                        <a:pt x="0" y="772048"/>
-                        <a:pt x="0" y="712825"/>
-                      </a:cubicBezTo>
-                      <a:lnTo>
-                        <a:pt x="0" y="10476"/>
-                      </a:lnTo>
-                      <a:close/>
-                    </a:path>
-                  </a:pathLst>
-                </a:custGeom>
-                <a:solidFill>
-                  <a:srgbClr val="F79646"/>
-                </a:solidFill>
-                <a:ln w="19050">
-                  <a:solidFill>
-                    <a:schemeClr val="bg1"/>
-                  </a:solidFill>
-                </a:ln>
-              </p:spPr>
-              <p:style>
-                <a:lnRef idx="2">
-                  <a:schemeClr val="accent1">
-                    <a:shade val="50000"/>
-                  </a:schemeClr>
-                </a:lnRef>
-                <a:fillRef idx="1">
-                  <a:schemeClr val="accent1"/>
-                </a:fillRef>
-                <a:effectRef idx="0">
-                  <a:schemeClr val="accent1"/>
-                </a:effectRef>
-                <a:fontRef idx="minor">
-                  <a:schemeClr val="lt1"/>
-                </a:fontRef>
-              </p:style>
-              <p:txBody>
-                <a:bodyPr rtlCol="0" anchor="ctr"/>
-                <a:lstStyle/>
-                <a:p>
-                  <a:pPr algn="ctr"/>
-                  <a:endParaRPr lang="en-SG"/>
-                </a:p>
-              </p:txBody>
-            </p:sp>
-          </p:grpSp>
-          <p:sp>
-            <p:nvSpPr>
-              <p:cNvPr id="120" name="Rectangle 119"/>
-              <p:cNvSpPr/>
-              <p:nvPr/>
-            </p:nvSpPr>
-            <p:spPr>
-              <a:xfrm rot="10800000">
-                <a:off x="4180111" y="1375544"/>
-                <a:ext cx="549071" cy="549822"/>
-              </a:xfrm>
-              <a:prstGeom prst="rect">
-                <a:avLst/>
-              </a:prstGeom>
-              <a:noFill/>
-              <a:ln>
-                <a:noFill/>
-              </a:ln>
-            </p:spPr>
-            <p:style>
-              <a:lnRef idx="2">
-                <a:schemeClr val="accent1">
-                  <a:shade val="50000"/>
-                </a:schemeClr>
-              </a:lnRef>
-              <a:fillRef idx="1">
-                <a:schemeClr val="accent1"/>
-              </a:fillRef>
-              <a:effectRef idx="0">
-                <a:schemeClr val="accent1"/>
-              </a:effectRef>
-              <a:fontRef idx="minor">
-                <a:schemeClr val="lt1"/>
-              </a:fontRef>
-            </p:style>
-            <p:txBody>
-              <a:bodyPr wrap="none" lIns="0" tIns="0" rIns="0" bIns="0" rtlCol="0" anchor="ctr"/>
-              <a:lstStyle/>
-              <a:p>
-                <a:pPr algn="ctr"/>
-                <a:endParaRPr lang="en-US" b="1"/>
-              </a:p>
-            </p:txBody>
-          </p:sp>
-        </p:grpSp>
-      </p:grpSp>
-      <p:grpSp>
-        <p:nvGrpSpPr>
-          <p:cNvPr id="125" name="Group 124"/>
-          <p:cNvGrpSpPr/>
-          <p:nvPr/>
-        </p:nvGrpSpPr>
-        <p:grpSpPr>
-          <a:xfrm>
-            <a:off x="1943693" y="1414827"/>
-            <a:ext cx="838200" cy="838200"/>
-            <a:chOff x="1002575" y="1231726"/>
-            <a:chExt cx="838200" cy="838200"/>
-          </a:xfrm>
-        </p:grpSpPr>
-        <p:sp>
-          <p:nvSpPr>
-            <p:cNvPr id="126" name="Rectangle 125"/>
-            <p:cNvSpPr/>
-            <p:nvPr/>
-          </p:nvSpPr>
-          <p:spPr>
-            <a:xfrm>
-              <a:off x="1002575" y="1231726"/>
-              <a:ext cx="838200" cy="838200"/>
-            </a:xfrm>
-            <a:prstGeom prst="rect">
-              <a:avLst/>
-            </a:prstGeom>
-            <a:noFill/>
-            <a:ln>
-              <a:noFill/>
-            </a:ln>
-          </p:spPr>
-          <p:style>
-            <a:lnRef idx="2">
-              <a:schemeClr val="accent1">
-                <a:shade val="50000"/>
-              </a:schemeClr>
-            </a:lnRef>
-            <a:fillRef idx="1">
-              <a:schemeClr val="accent1"/>
-            </a:fillRef>
-            <a:effectRef idx="0">
-              <a:schemeClr val="accent1"/>
-            </a:effectRef>
-            <a:fontRef idx="minor">
-              <a:schemeClr val="lt1"/>
-            </a:fontRef>
-          </p:style>
-          <p:txBody>
-            <a:bodyPr rtlCol="0" anchor="ctr"/>
-            <a:lstStyle/>
-            <a:p>
-              <a:pPr algn="ctr"/>
-              <a:endParaRPr lang="en-SG"/>
-            </a:p>
-          </p:txBody>
-        </p:sp>
-        <p:sp>
-          <p:nvSpPr>
-            <p:cNvPr id="133" name="Rectangle 4"/>
-            <p:cNvSpPr/>
-            <p:nvPr/>
-          </p:nvSpPr>
-          <p:spPr>
-            <a:xfrm rot="16200000">
-              <a:off x="1071530" y="1304929"/>
-              <a:ext cx="700291" cy="690781"/>
-            </a:xfrm>
-            <a:custGeom>
-              <a:avLst/>
-              <a:gdLst/>
-              <a:ahLst/>
-              <a:cxnLst/>
-              <a:rect l="l" t="t" r="r" b="b"/>
-              <a:pathLst>
-                <a:path w="1752603" h="1752600">
-                  <a:moveTo>
-                    <a:pt x="533400" y="0"/>
-                  </a:moveTo>
-                  <a:lnTo>
-                    <a:pt x="533403" y="0"/>
-                  </a:lnTo>
-                  <a:lnTo>
-                    <a:pt x="1066800" y="0"/>
-                  </a:lnTo>
-                  <a:lnTo>
-                    <a:pt x="1752603" y="0"/>
-                  </a:lnTo>
-                  <a:lnTo>
-                    <a:pt x="1752603" y="1752600"/>
-                  </a:lnTo>
-                  <a:lnTo>
-                    <a:pt x="1219203" y="1752600"/>
-                  </a:lnTo>
-                  <a:lnTo>
-                    <a:pt x="533403" y="1752600"/>
-                  </a:lnTo>
-                  <a:lnTo>
-                    <a:pt x="3" y="1752600"/>
-                  </a:lnTo>
-                  <a:lnTo>
-                    <a:pt x="3" y="533430"/>
-                  </a:lnTo>
-                  <a:cubicBezTo>
-                    <a:pt x="0" y="533420"/>
-                    <a:pt x="0" y="533410"/>
-                    <a:pt x="0" y="533400"/>
-                  </a:cubicBezTo>
-                  <a:cubicBezTo>
-                    <a:pt x="0" y="238811"/>
-                    <a:pt x="238811" y="0"/>
-                    <a:pt x="533400" y="0"/>
-                  </a:cubicBezTo>
-                  <a:close/>
-                </a:path>
-              </a:pathLst>
-            </a:custGeom>
-            <a:noFill/>
-            <a:ln w="76200" cmpd="sng">
-              <a:solidFill>
-                <a:srgbClr val="0070C0"/>
-              </a:solidFill>
-              <a:miter lim="800000"/>
-            </a:ln>
-          </p:spPr>
-          <p:style>
-            <a:lnRef idx="2">
-              <a:schemeClr val="accent1">
-                <a:shade val="50000"/>
-              </a:schemeClr>
-            </a:lnRef>
-            <a:fillRef idx="1">
-              <a:schemeClr val="accent1"/>
-            </a:fillRef>
-            <a:effectRef idx="0">
-              <a:schemeClr val="accent1"/>
-            </a:effectRef>
-            <a:fontRef idx="minor">
-              <a:schemeClr val="lt1"/>
-            </a:fontRef>
-          </p:style>
-          <p:txBody>
-            <a:bodyPr rtlCol="0" anchor="ctr"/>
-            <a:lstStyle/>
-            <a:p>
-              <a:pPr algn="ctr"/>
-              <a:endParaRPr lang="en-US"/>
-            </a:p>
-          </p:txBody>
-        </p:sp>
-      </p:grpSp>
-      <p:grpSp>
-        <p:nvGrpSpPr>
-          <p:cNvPr id="134" name="Group 133"/>
-          <p:cNvGrpSpPr/>
-          <p:nvPr/>
-        </p:nvGrpSpPr>
-        <p:grpSpPr>
-          <a:xfrm>
-            <a:off x="2088257" y="1552453"/>
-            <a:ext cx="549071" cy="549822"/>
-            <a:chOff x="4180111" y="1375544"/>
-            <a:chExt cx="549071" cy="549822"/>
-          </a:xfrm>
-        </p:grpSpPr>
-        <p:grpSp>
-          <p:nvGrpSpPr>
-            <p:cNvPr id="135" name="Group 134"/>
-            <p:cNvGrpSpPr/>
-            <p:nvPr/>
-          </p:nvGrpSpPr>
-          <p:grpSpPr>
-            <a:xfrm>
-              <a:off x="4235574" y="1385216"/>
-              <a:ext cx="446467" cy="521728"/>
-              <a:chOff x="4821567" y="919204"/>
-              <a:chExt cx="446467" cy="521728"/>
-            </a:xfrm>
-          </p:grpSpPr>
-          <p:sp>
-            <p:nvSpPr>
-              <p:cNvPr id="137" name="Rectangle 136"/>
-              <p:cNvSpPr/>
-              <p:nvPr/>
-            </p:nvSpPr>
-            <p:spPr>
-              <a:xfrm>
-                <a:off x="4821567" y="971454"/>
-                <a:ext cx="343904" cy="406070"/>
-              </a:xfrm>
-              <a:prstGeom prst="rect">
-                <a:avLst/>
-              </a:prstGeom>
-              <a:solidFill>
-                <a:srgbClr val="0070C0"/>
-              </a:solidFill>
-              <a:ln>
-                <a:noFill/>
-              </a:ln>
-            </p:spPr>
-            <p:style>
-              <a:lnRef idx="2">
-                <a:schemeClr val="accent1">
-                  <a:shade val="50000"/>
-                </a:schemeClr>
-              </a:lnRef>
-              <a:fillRef idx="1">
-                <a:schemeClr val="accent1"/>
-              </a:fillRef>
-              <a:effectRef idx="0">
-                <a:schemeClr val="accent1"/>
-              </a:effectRef>
-              <a:fontRef idx="minor">
-                <a:schemeClr val="lt1"/>
-              </a:fontRef>
-            </p:style>
-            <p:txBody>
-              <a:bodyPr rtlCol="0" anchor="ctr"/>
-              <a:lstStyle/>
-              <a:p>
-                <a:pPr algn="ctr"/>
-                <a:endParaRPr lang="en-US"/>
-              </a:p>
-            </p:txBody>
-          </p:sp>
-          <p:sp>
-            <p:nvSpPr>
-              <p:cNvPr id="138" name="Rectangle: Folded Corner 137"/>
-              <p:cNvSpPr/>
-              <p:nvPr/>
-            </p:nvSpPr>
-            <p:spPr>
-              <a:xfrm rot="10800000" flipH="1">
-                <a:off x="4990894" y="1102754"/>
-                <a:ext cx="277140" cy="338178"/>
-              </a:xfrm>
-              <a:prstGeom prst="foldedCorner">
-                <a:avLst>
-                  <a:gd name="adj" fmla="val 44103"/>
-                </a:avLst>
-              </a:prstGeom>
-              <a:solidFill>
-                <a:schemeClr val="bg1"/>
-              </a:solidFill>
-              <a:ln>
-                <a:solidFill>
-                  <a:srgbClr val="F79646"/>
-                </a:solidFill>
-              </a:ln>
-            </p:spPr>
-            <p:style>
-              <a:lnRef idx="2">
-                <a:schemeClr val="accent1">
-                  <a:shade val="50000"/>
-                </a:schemeClr>
-              </a:lnRef>
-              <a:fillRef idx="1">
-                <a:schemeClr val="accent1"/>
-              </a:fillRef>
-              <a:effectRef idx="0">
-                <a:schemeClr val="accent1"/>
-              </a:effectRef>
-              <a:fontRef idx="minor">
-                <a:schemeClr val="lt1"/>
-              </a:fontRef>
-            </p:style>
-            <p:txBody>
-              <a:bodyPr rtlCol="0" anchor="ctr"/>
-              <a:lstStyle/>
-              <a:p>
-                <a:pPr algn="ctr"/>
-                <a:endParaRPr lang="en-US"/>
-              </a:p>
-            </p:txBody>
-          </p:sp>
-          <p:sp>
-            <p:nvSpPr>
-              <p:cNvPr id="139" name="Rounded Rectangle 227"/>
-              <p:cNvSpPr/>
-              <p:nvPr/>
-            </p:nvSpPr>
-            <p:spPr>
-              <a:xfrm rot="10800000">
-                <a:off x="4879960" y="919204"/>
-                <a:ext cx="234247" cy="101171"/>
-              </a:xfrm>
-              <a:custGeom>
-                <a:avLst/>
-                <a:gdLst/>
-                <a:ahLst/>
-                <a:cxnLst/>
-                <a:rect l="l" t="t" r="r" b="b"/>
-                <a:pathLst>
-                  <a:path w="286327" h="1000124">
-                    <a:moveTo>
-                      <a:pt x="2115" y="0"/>
-                    </a:moveTo>
-                    <a:lnTo>
-                      <a:pt x="284212" y="0"/>
-                    </a:lnTo>
-                    <a:cubicBezTo>
-                      <a:pt x="286188" y="3367"/>
-                      <a:pt x="286327" y="6905"/>
-                      <a:pt x="286327" y="10476"/>
-                    </a:cubicBezTo>
-                    <a:lnTo>
-                      <a:pt x="286327" y="712825"/>
-                    </a:lnTo>
-                    <a:cubicBezTo>
-                      <a:pt x="286327" y="772047"/>
-                      <a:pt x="247915" y="822299"/>
-                      <a:pt x="194109" y="838409"/>
-                    </a:cubicBezTo>
-                    <a:cubicBezTo>
-                      <a:pt x="194108" y="875332"/>
-                      <a:pt x="194108" y="912256"/>
-                      <a:pt x="194108" y="949179"/>
-                    </a:cubicBezTo>
-                    <a:cubicBezTo>
-                      <a:pt x="194108" y="977315"/>
-                      <a:pt x="171299" y="1000124"/>
-                      <a:pt x="143163" y="1000124"/>
-                    </a:cubicBezTo>
-                    <a:lnTo>
-                      <a:pt x="143164" y="1000123"/>
-                    </a:lnTo>
-                    <a:cubicBezTo>
-                      <a:pt x="115028" y="1000123"/>
-                      <a:pt x="92219" y="977314"/>
-                      <a:pt x="92219" y="949178"/>
-                    </a:cubicBezTo>
-                    <a:lnTo>
-                      <a:pt x="92219" y="838409"/>
-                    </a:lnTo>
-                    <a:cubicBezTo>
-                      <a:pt x="38413" y="822299"/>
-                      <a:pt x="0" y="772048"/>
-                      <a:pt x="0" y="712825"/>
-                    </a:cubicBezTo>
-                    <a:lnTo>
-                      <a:pt x="0" y="10476"/>
-                    </a:lnTo>
-                    <a:close/>
-                  </a:path>
-                </a:pathLst>
-              </a:custGeom>
-              <a:solidFill>
-                <a:srgbClr val="0070C0"/>
-              </a:solidFill>
-              <a:ln w="19050">
-                <a:solidFill>
-                  <a:schemeClr val="bg1"/>
-                </a:solidFill>
-              </a:ln>
-            </p:spPr>
-            <p:style>
-              <a:lnRef idx="2">
-                <a:schemeClr val="accent1">
-                  <a:shade val="50000"/>
-                </a:schemeClr>
-              </a:lnRef>
-              <a:fillRef idx="1">
-                <a:schemeClr val="accent1"/>
-              </a:fillRef>
-              <a:effectRef idx="0">
-                <a:schemeClr val="accent1"/>
-              </a:effectRef>
-              <a:fontRef idx="minor">
-                <a:schemeClr val="lt1"/>
-              </a:fontRef>
-            </p:style>
-            <p:txBody>
-              <a:bodyPr rtlCol="0" anchor="ctr"/>
-              <a:lstStyle/>
-              <a:p>
-                <a:pPr algn="ctr"/>
-                <a:endParaRPr lang="en-SG"/>
-              </a:p>
-            </p:txBody>
-          </p:sp>
-        </p:grpSp>
-        <p:sp>
-          <p:nvSpPr>
-            <p:cNvPr id="136" name="Rectangle 135"/>
-            <p:cNvSpPr/>
-            <p:nvPr/>
-          </p:nvSpPr>
-          <p:spPr>
-            <a:xfrm rot="10800000">
-              <a:off x="4180111" y="1375544"/>
-              <a:ext cx="549071" cy="549822"/>
-            </a:xfrm>
-            <a:prstGeom prst="rect">
-              <a:avLst/>
-            </a:prstGeom>
-            <a:noFill/>
-            <a:ln>
-              <a:noFill/>
-            </a:ln>
-          </p:spPr>
-          <p:style>
-            <a:lnRef idx="2">
-              <a:schemeClr val="accent1">
-                <a:shade val="50000"/>
-              </a:schemeClr>
-            </a:lnRef>
-            <a:fillRef idx="1">
-              <a:schemeClr val="accent1"/>
-            </a:fillRef>
-            <a:effectRef idx="0">
-              <a:schemeClr val="accent1"/>
-            </a:effectRef>
-            <a:fontRef idx="minor">
-              <a:schemeClr val="lt1"/>
-            </a:fontRef>
-          </p:style>
-          <p:txBody>
-            <a:bodyPr wrap="none" lIns="0" tIns="0" rIns="0" bIns="0" rtlCol="0" anchor="ctr"/>
-            <a:lstStyle/>
-            <a:p>
-              <a:pPr algn="ctr"/>
-              <a:endParaRPr lang="en-US" b="1"/>
-            </a:p>
-          </p:txBody>
-        </p:sp>
-      </p:grpSp>
       <p:sp>
         <p:nvSpPr>
           <p:cNvPr id="213" name="TextBox 212"/>
@@ -7470,6 +6601,1311 @@
           </a:p>
         </p:txBody>
       </p:sp>
+      <p:sp>
+        <p:nvSpPr>
+          <p:cNvPr id="104" name="Freeform: Shape 103">
+            <a:extLst>
+              <a:ext uri="{FF2B5EF4-FFF2-40B4-BE49-F238E27FC236}">
+                <a16:creationId xmlns:a16="http://schemas.microsoft.com/office/drawing/2014/main" id="{B5704358-C708-4F57-9084-A80B4B7E5AF3}"/>
+              </a:ext>
+            </a:extLst>
+          </p:cNvPr>
+          <p:cNvSpPr/>
+          <p:nvPr/>
+        </p:nvSpPr>
+        <p:spPr>
+          <a:xfrm>
+            <a:off x="2582428" y="1495841"/>
+            <a:ext cx="343904" cy="406070"/>
+          </a:xfrm>
+          <a:custGeom>
+            <a:avLst/>
+            <a:gdLst>
+              <a:gd name="connsiteX0" fmla="*/ 0 w 343904"/>
+              <a:gd name="connsiteY0" fmla="*/ 0 h 406070"/>
+              <a:gd name="connsiteX1" fmla="*/ 58393 w 343904"/>
+              <a:gd name="connsiteY1" fmla="*/ 0 h 406070"/>
+              <a:gd name="connsiteX2" fmla="*/ 58393 w 343904"/>
+              <a:gd name="connsiteY2" fmla="*/ 47861 h 406070"/>
+              <a:gd name="connsiteX3" fmla="*/ 60123 w 343904"/>
+              <a:gd name="connsiteY3" fmla="*/ 48921 h 406070"/>
+              <a:gd name="connsiteX4" fmla="*/ 290910 w 343904"/>
+              <a:gd name="connsiteY4" fmla="*/ 48921 h 406070"/>
+              <a:gd name="connsiteX5" fmla="*/ 292640 w 343904"/>
+              <a:gd name="connsiteY5" fmla="*/ 47861 h 406070"/>
+              <a:gd name="connsiteX6" fmla="*/ 292640 w 343904"/>
+              <a:gd name="connsiteY6" fmla="*/ 0 h 406070"/>
+              <a:gd name="connsiteX7" fmla="*/ 343904 w 343904"/>
+              <a:gd name="connsiteY7" fmla="*/ 0 h 406070"/>
+              <a:gd name="connsiteX8" fmla="*/ 343904 w 343904"/>
+              <a:gd name="connsiteY8" fmla="*/ 131625 h 406070"/>
+              <a:gd name="connsiteX9" fmla="*/ 324565 w 343904"/>
+              <a:gd name="connsiteY9" fmla="*/ 131625 h 406070"/>
+              <a:gd name="connsiteX10" fmla="*/ 324240 w 343904"/>
+              <a:gd name="connsiteY10" fmla="*/ 131300 h 406070"/>
+              <a:gd name="connsiteX11" fmla="*/ 169327 w 343904"/>
+              <a:gd name="connsiteY11" fmla="*/ 131300 h 406070"/>
+              <a:gd name="connsiteX12" fmla="*/ 169327 w 343904"/>
+              <a:gd name="connsiteY12" fmla="*/ 406070 h 406070"/>
+              <a:gd name="connsiteX13" fmla="*/ 0 w 343904"/>
+              <a:gd name="connsiteY13" fmla="*/ 406070 h 406070"/>
+            </a:gdLst>
+            <a:ahLst/>
+            <a:cxnLst>
+              <a:cxn ang="0">
+                <a:pos x="connsiteX0" y="connsiteY0"/>
+              </a:cxn>
+              <a:cxn ang="0">
+                <a:pos x="connsiteX1" y="connsiteY1"/>
+              </a:cxn>
+              <a:cxn ang="0">
+                <a:pos x="connsiteX2" y="connsiteY2"/>
+              </a:cxn>
+              <a:cxn ang="0">
+                <a:pos x="connsiteX3" y="connsiteY3"/>
+              </a:cxn>
+              <a:cxn ang="0">
+                <a:pos x="connsiteX4" y="connsiteY4"/>
+              </a:cxn>
+              <a:cxn ang="0">
+                <a:pos x="connsiteX5" y="connsiteY5"/>
+              </a:cxn>
+              <a:cxn ang="0">
+                <a:pos x="connsiteX6" y="connsiteY6"/>
+              </a:cxn>
+              <a:cxn ang="0">
+                <a:pos x="connsiteX7" y="connsiteY7"/>
+              </a:cxn>
+              <a:cxn ang="0">
+                <a:pos x="connsiteX8" y="connsiteY8"/>
+              </a:cxn>
+              <a:cxn ang="0">
+                <a:pos x="connsiteX9" y="connsiteY9"/>
+              </a:cxn>
+              <a:cxn ang="0">
+                <a:pos x="connsiteX10" y="connsiteY10"/>
+              </a:cxn>
+              <a:cxn ang="0">
+                <a:pos x="connsiteX11" y="connsiteY11"/>
+              </a:cxn>
+              <a:cxn ang="0">
+                <a:pos x="connsiteX12" y="connsiteY12"/>
+              </a:cxn>
+              <a:cxn ang="0">
+                <a:pos x="connsiteX13" y="connsiteY13"/>
+              </a:cxn>
+            </a:cxnLst>
+            <a:rect l="l" t="t" r="r" b="b"/>
+            <a:pathLst>
+              <a:path w="343904" h="406070">
+                <a:moveTo>
+                  <a:pt x="0" y="0"/>
+                </a:moveTo>
+                <a:lnTo>
+                  <a:pt x="58393" y="0"/>
+                </a:lnTo>
+                <a:lnTo>
+                  <a:pt x="58393" y="47861"/>
+                </a:lnTo>
+                <a:cubicBezTo>
+                  <a:pt x="58393" y="48223"/>
+                  <a:pt x="58507" y="48580"/>
+                  <a:pt x="60123" y="48921"/>
+                </a:cubicBezTo>
+                <a:lnTo>
+                  <a:pt x="290910" y="48921"/>
+                </a:lnTo>
+                <a:lnTo>
+                  <a:pt x="292640" y="47861"/>
+                </a:lnTo>
+                <a:lnTo>
+                  <a:pt x="292640" y="0"/>
+                </a:lnTo>
+                <a:lnTo>
+                  <a:pt x="343904" y="0"/>
+                </a:lnTo>
+                <a:lnTo>
+                  <a:pt x="343904" y="131625"/>
+                </a:lnTo>
+                <a:lnTo>
+                  <a:pt x="324565" y="131625"/>
+                </a:lnTo>
+                <a:lnTo>
+                  <a:pt x="324240" y="131300"/>
+                </a:lnTo>
+                <a:lnTo>
+                  <a:pt x="169327" y="131300"/>
+                </a:lnTo>
+                <a:lnTo>
+                  <a:pt x="169327" y="406070"/>
+                </a:lnTo>
+                <a:lnTo>
+                  <a:pt x="0" y="406070"/>
+                </a:lnTo>
+                <a:close/>
+              </a:path>
+            </a:pathLst>
+          </a:custGeom>
+          <a:solidFill>
+            <a:srgbClr val="F79646"/>
+          </a:solidFill>
+          <a:ln>
+            <a:noFill/>
+          </a:ln>
+        </p:spPr>
+        <p:style>
+          <a:lnRef idx="2">
+            <a:schemeClr val="accent1">
+              <a:shade val="50000"/>
+            </a:schemeClr>
+          </a:lnRef>
+          <a:fillRef idx="1">
+            <a:schemeClr val="accent1"/>
+          </a:fillRef>
+          <a:effectRef idx="0">
+            <a:schemeClr val="accent1"/>
+          </a:effectRef>
+          <a:fontRef idx="minor">
+            <a:schemeClr val="lt1"/>
+          </a:fontRef>
+        </p:style>
+        <p:txBody>
+          <a:bodyPr wrap="square" rtlCol="0" anchor="ctr">
+            <a:noAutofit/>
+          </a:bodyPr>
+          <a:lstStyle/>
+          <a:p>
+            <a:pPr algn="ctr"/>
+            <a:endParaRPr lang="en-US"/>
+          </a:p>
+        </p:txBody>
+      </p:sp>
+      <p:sp>
+        <p:nvSpPr>
+          <p:cNvPr id="96" name="Rounded Rectangle 227">
+            <a:extLst>
+              <a:ext uri="{FF2B5EF4-FFF2-40B4-BE49-F238E27FC236}">
+                <a16:creationId xmlns:a16="http://schemas.microsoft.com/office/drawing/2014/main" id="{A8E5C5D2-FD18-4149-A1B4-7006ADC53389}"/>
+              </a:ext>
+            </a:extLst>
+          </p:cNvPr>
+          <p:cNvSpPr/>
+          <p:nvPr/>
+        </p:nvSpPr>
+        <p:spPr>
+          <a:xfrm rot="10800000">
+            <a:off x="2661061" y="1442406"/>
+            <a:ext cx="193468" cy="83559"/>
+          </a:xfrm>
+          <a:custGeom>
+            <a:avLst/>
+            <a:gdLst/>
+            <a:ahLst/>
+            <a:cxnLst/>
+            <a:rect l="l" t="t" r="r" b="b"/>
+            <a:pathLst>
+              <a:path w="286327" h="1000124">
+                <a:moveTo>
+                  <a:pt x="2115" y="0"/>
+                </a:moveTo>
+                <a:lnTo>
+                  <a:pt x="284212" y="0"/>
+                </a:lnTo>
+                <a:cubicBezTo>
+                  <a:pt x="286188" y="3367"/>
+                  <a:pt x="286327" y="6905"/>
+                  <a:pt x="286327" y="10476"/>
+                </a:cubicBezTo>
+                <a:lnTo>
+                  <a:pt x="286327" y="712825"/>
+                </a:lnTo>
+                <a:cubicBezTo>
+                  <a:pt x="286327" y="772047"/>
+                  <a:pt x="247915" y="822299"/>
+                  <a:pt x="194109" y="838409"/>
+                </a:cubicBezTo>
+                <a:cubicBezTo>
+                  <a:pt x="194108" y="875332"/>
+                  <a:pt x="194108" y="912256"/>
+                  <a:pt x="194108" y="949179"/>
+                </a:cubicBezTo>
+                <a:cubicBezTo>
+                  <a:pt x="194108" y="977315"/>
+                  <a:pt x="171299" y="1000124"/>
+                  <a:pt x="143163" y="1000124"/>
+                </a:cubicBezTo>
+                <a:lnTo>
+                  <a:pt x="143164" y="1000123"/>
+                </a:lnTo>
+                <a:cubicBezTo>
+                  <a:pt x="115028" y="1000123"/>
+                  <a:pt x="92219" y="977314"/>
+                  <a:pt x="92219" y="949178"/>
+                </a:cubicBezTo>
+                <a:lnTo>
+                  <a:pt x="92219" y="838409"/>
+                </a:lnTo>
+                <a:cubicBezTo>
+                  <a:pt x="38413" y="822299"/>
+                  <a:pt x="0" y="772048"/>
+                  <a:pt x="0" y="712825"/>
+                </a:cubicBezTo>
+                <a:lnTo>
+                  <a:pt x="0" y="10476"/>
+                </a:lnTo>
+                <a:close/>
+              </a:path>
+            </a:pathLst>
+          </a:custGeom>
+          <a:solidFill>
+            <a:srgbClr val="F79646"/>
+          </a:solidFill>
+          <a:ln w="19050">
+            <a:noFill/>
+          </a:ln>
+        </p:spPr>
+        <p:style>
+          <a:lnRef idx="2">
+            <a:schemeClr val="accent1">
+              <a:shade val="50000"/>
+            </a:schemeClr>
+          </a:lnRef>
+          <a:fillRef idx="1">
+            <a:schemeClr val="accent1"/>
+          </a:fillRef>
+          <a:effectRef idx="0">
+            <a:schemeClr val="accent1"/>
+          </a:effectRef>
+          <a:fontRef idx="minor">
+            <a:schemeClr val="lt1"/>
+          </a:fontRef>
+        </p:style>
+        <p:txBody>
+          <a:bodyPr rtlCol="0" anchor="ctr"/>
+          <a:lstStyle/>
+          <a:p>
+            <a:pPr algn="ctr"/>
+            <a:endParaRPr lang="en-SG"/>
+          </a:p>
+        </p:txBody>
+      </p:sp>
+      <p:sp>
+        <p:nvSpPr>
+          <p:cNvPr id="148" name="Freeform: Shape 147">
+            <a:extLst>
+              <a:ext uri="{FF2B5EF4-FFF2-40B4-BE49-F238E27FC236}">
+                <a16:creationId xmlns:a16="http://schemas.microsoft.com/office/drawing/2014/main" id="{DD892782-A0CE-4B33-89B0-93E71BFC2F2C}"/>
+              </a:ext>
+            </a:extLst>
+          </p:cNvPr>
+          <p:cNvSpPr/>
+          <p:nvPr/>
+        </p:nvSpPr>
+        <p:spPr>
+          <a:xfrm rot="10800000" flipH="1">
+            <a:off x="2773976" y="1645863"/>
+            <a:ext cx="263060" cy="320997"/>
+          </a:xfrm>
+          <a:custGeom>
+            <a:avLst/>
+            <a:gdLst>
+              <a:gd name="connsiteX0" fmla="*/ 0 w 263060"/>
+              <a:gd name="connsiteY0" fmla="*/ 320997 h 320997"/>
+              <a:gd name="connsiteX1" fmla="*/ 143192 w 263060"/>
+              <a:gd name="connsiteY1" fmla="*/ 320997 h 320997"/>
+              <a:gd name="connsiteX2" fmla="*/ 166675 w 263060"/>
+              <a:gd name="connsiteY2" fmla="*/ 224469 h 320997"/>
+              <a:gd name="connsiteX3" fmla="*/ 167872 w 263060"/>
+              <a:gd name="connsiteY3" fmla="*/ 224760 h 320997"/>
+              <a:gd name="connsiteX4" fmla="*/ 167552 w 263060"/>
+              <a:gd name="connsiteY4" fmla="*/ 223402 h 320997"/>
+              <a:gd name="connsiteX5" fmla="*/ 263060 w 263060"/>
+              <a:gd name="connsiteY5" fmla="*/ 200938 h 320997"/>
+              <a:gd name="connsiteX6" fmla="*/ 263060 w 263060"/>
+              <a:gd name="connsiteY6" fmla="*/ 0 h 320997"/>
+              <a:gd name="connsiteX7" fmla="*/ 0 w 263060"/>
+              <a:gd name="connsiteY7" fmla="*/ 0 h 320997"/>
+            </a:gdLst>
+            <a:ahLst/>
+            <a:cxnLst>
+              <a:cxn ang="0">
+                <a:pos x="connsiteX0" y="connsiteY0"/>
+              </a:cxn>
+              <a:cxn ang="0">
+                <a:pos x="connsiteX1" y="connsiteY1"/>
+              </a:cxn>
+              <a:cxn ang="0">
+                <a:pos x="connsiteX2" y="connsiteY2"/>
+              </a:cxn>
+              <a:cxn ang="0">
+                <a:pos x="connsiteX3" y="connsiteY3"/>
+              </a:cxn>
+              <a:cxn ang="0">
+                <a:pos x="connsiteX4" y="connsiteY4"/>
+              </a:cxn>
+              <a:cxn ang="0">
+                <a:pos x="connsiteX5" y="connsiteY5"/>
+              </a:cxn>
+              <a:cxn ang="0">
+                <a:pos x="connsiteX6" y="connsiteY6"/>
+              </a:cxn>
+              <a:cxn ang="0">
+                <a:pos x="connsiteX7" y="connsiteY7"/>
+              </a:cxn>
+            </a:cxnLst>
+            <a:rect l="l" t="t" r="r" b="b"/>
+            <a:pathLst>
+              <a:path w="263060" h="320997">
+                <a:moveTo>
+                  <a:pt x="0" y="320997"/>
+                </a:moveTo>
+                <a:lnTo>
+                  <a:pt x="143192" y="320997"/>
+                </a:lnTo>
+                <a:lnTo>
+                  <a:pt x="166675" y="224469"/>
+                </a:lnTo>
+                <a:lnTo>
+                  <a:pt x="167872" y="224760"/>
+                </a:lnTo>
+                <a:lnTo>
+                  <a:pt x="167552" y="223402"/>
+                </a:lnTo>
+                <a:lnTo>
+                  <a:pt x="263060" y="200938"/>
+                </a:lnTo>
+                <a:lnTo>
+                  <a:pt x="263060" y="0"/>
+                </a:lnTo>
+                <a:lnTo>
+                  <a:pt x="0" y="0"/>
+                </a:lnTo>
+                <a:close/>
+              </a:path>
+            </a:pathLst>
+          </a:custGeom>
+          <a:solidFill>
+            <a:srgbClr val="0070C0"/>
+          </a:solidFill>
+          <a:ln>
+            <a:noFill/>
+          </a:ln>
+        </p:spPr>
+        <p:style>
+          <a:lnRef idx="2">
+            <a:schemeClr val="accent1"/>
+          </a:lnRef>
+          <a:fillRef idx="1">
+            <a:schemeClr val="lt1"/>
+          </a:fillRef>
+          <a:effectRef idx="0">
+            <a:schemeClr val="accent1"/>
+          </a:effectRef>
+          <a:fontRef idx="minor">
+            <a:schemeClr val="dk1"/>
+          </a:fontRef>
+        </p:style>
+        <p:txBody>
+          <a:bodyPr wrap="square" rtlCol="0" anchor="ctr">
+            <a:noAutofit/>
+          </a:bodyPr>
+          <a:lstStyle/>
+          <a:p>
+            <a:pPr algn="ctr"/>
+            <a:endParaRPr lang="en-US" dirty="0"/>
+          </a:p>
+        </p:txBody>
+      </p:sp>
+      <p:sp>
+        <p:nvSpPr>
+          <p:cNvPr id="153" name="Freeform: Shape 152">
+            <a:extLst>
+              <a:ext uri="{FF2B5EF4-FFF2-40B4-BE49-F238E27FC236}">
+                <a16:creationId xmlns:a16="http://schemas.microsoft.com/office/drawing/2014/main" id="{05BD2F97-CF86-4565-A19A-DA5A42F2C7BD}"/>
+              </a:ext>
+            </a:extLst>
+          </p:cNvPr>
+          <p:cNvSpPr/>
+          <p:nvPr/>
+        </p:nvSpPr>
+        <p:spPr>
+          <a:xfrm rot="794163">
+            <a:off x="2926296" y="1657162"/>
+            <a:ext cx="123332" cy="75934"/>
+          </a:xfrm>
+          <a:custGeom>
+            <a:avLst/>
+            <a:gdLst>
+              <a:gd name="connsiteX0" fmla="*/ 0 w 144316"/>
+              <a:gd name="connsiteY0" fmla="*/ 0 h 88854"/>
+              <a:gd name="connsiteX1" fmla="*/ 144288 w 144316"/>
+              <a:gd name="connsiteY1" fmla="*/ 88733 h 88854"/>
+              <a:gd name="connsiteX2" fmla="*/ 144316 w 144316"/>
+              <a:gd name="connsiteY2" fmla="*/ 88854 h 88854"/>
+              <a:gd name="connsiteX3" fmla="*/ 45769 w 144316"/>
+              <a:gd name="connsiteY3" fmla="*/ 88854 h 88854"/>
+              <a:gd name="connsiteX4" fmla="*/ 45769 w 144316"/>
+              <a:gd name="connsiteY4" fmla="*/ 87459 h 88854"/>
+              <a:gd name="connsiteX5" fmla="*/ 44671 w 144316"/>
+              <a:gd name="connsiteY5" fmla="*/ 88016 h 88854"/>
+            </a:gdLst>
+            <a:ahLst/>
+            <a:cxnLst>
+              <a:cxn ang="0">
+                <a:pos x="connsiteX0" y="connsiteY0"/>
+              </a:cxn>
+              <a:cxn ang="0">
+                <a:pos x="connsiteX1" y="connsiteY1"/>
+              </a:cxn>
+              <a:cxn ang="0">
+                <a:pos x="connsiteX2" y="connsiteY2"/>
+              </a:cxn>
+              <a:cxn ang="0">
+                <a:pos x="connsiteX3" y="connsiteY3"/>
+              </a:cxn>
+              <a:cxn ang="0">
+                <a:pos x="connsiteX4" y="connsiteY4"/>
+              </a:cxn>
+              <a:cxn ang="0">
+                <a:pos x="connsiteX5" y="connsiteY5"/>
+              </a:cxn>
+            </a:cxnLst>
+            <a:rect l="l" t="t" r="r" b="b"/>
+            <a:pathLst>
+              <a:path w="144316" h="88854">
+                <a:moveTo>
+                  <a:pt x="0" y="0"/>
+                </a:moveTo>
+                <a:lnTo>
+                  <a:pt x="144288" y="88733"/>
+                </a:lnTo>
+                <a:lnTo>
+                  <a:pt x="144316" y="88854"/>
+                </a:lnTo>
+                <a:lnTo>
+                  <a:pt x="45769" y="88854"/>
+                </a:lnTo>
+                <a:lnTo>
+                  <a:pt x="45769" y="87459"/>
+                </a:lnTo>
+                <a:lnTo>
+                  <a:pt x="44671" y="88016"/>
+                </a:lnTo>
+                <a:close/>
+              </a:path>
+            </a:pathLst>
+          </a:custGeom>
+          <a:solidFill>
+            <a:srgbClr val="0070C0"/>
+          </a:solidFill>
+          <a:ln>
+            <a:noFill/>
+          </a:ln>
+        </p:spPr>
+        <p:style>
+          <a:lnRef idx="2">
+            <a:schemeClr val="accent1">
+              <a:shade val="50000"/>
+            </a:schemeClr>
+          </a:lnRef>
+          <a:fillRef idx="1">
+            <a:schemeClr val="accent1"/>
+          </a:fillRef>
+          <a:effectRef idx="0">
+            <a:schemeClr val="accent1"/>
+          </a:effectRef>
+          <a:fontRef idx="minor">
+            <a:schemeClr val="lt1"/>
+          </a:fontRef>
+        </p:style>
+        <p:txBody>
+          <a:bodyPr rtlCol="0" anchor="ctr"/>
+          <a:lstStyle/>
+          <a:p>
+            <a:pPr algn="ctr"/>
+            <a:endParaRPr lang="en-US"/>
+          </a:p>
+        </p:txBody>
+      </p:sp>
+      <p:grpSp>
+        <p:nvGrpSpPr>
+          <p:cNvPr id="14" name="Group 13">
+            <a:extLst>
+              <a:ext uri="{FF2B5EF4-FFF2-40B4-BE49-F238E27FC236}">
+                <a16:creationId xmlns:a16="http://schemas.microsoft.com/office/drawing/2014/main" id="{D893555B-2CCD-4C7F-92F0-96D7570DF7E4}"/>
+              </a:ext>
+            </a:extLst>
+          </p:cNvPr>
+          <p:cNvGrpSpPr/>
+          <p:nvPr/>
+        </p:nvGrpSpPr>
+        <p:grpSpPr>
+          <a:xfrm>
+            <a:off x="931555" y="1414827"/>
+            <a:ext cx="838200" cy="838200"/>
+            <a:chOff x="931555" y="1414827"/>
+            <a:chExt cx="838200" cy="838200"/>
+          </a:xfrm>
+        </p:grpSpPr>
+        <p:grpSp>
+          <p:nvGrpSpPr>
+            <p:cNvPr id="2" name="Group 1"/>
+            <p:cNvGrpSpPr/>
+            <p:nvPr/>
+          </p:nvGrpSpPr>
+          <p:grpSpPr>
+            <a:xfrm>
+              <a:off x="931555" y="1414827"/>
+              <a:ext cx="838200" cy="838200"/>
+              <a:chOff x="931555" y="1414827"/>
+              <a:chExt cx="838200" cy="838200"/>
+            </a:xfrm>
+          </p:grpSpPr>
+          <p:grpSp>
+            <p:nvGrpSpPr>
+              <p:cNvPr id="150" name="Group 149"/>
+              <p:cNvGrpSpPr/>
+              <p:nvPr/>
+            </p:nvGrpSpPr>
+            <p:grpSpPr>
+              <a:xfrm>
+                <a:off x="931555" y="1414827"/>
+                <a:ext cx="838200" cy="838200"/>
+                <a:chOff x="1002575" y="1231726"/>
+                <a:chExt cx="838200" cy="838200"/>
+              </a:xfrm>
+            </p:grpSpPr>
+            <p:sp>
+              <p:nvSpPr>
+                <p:cNvPr id="151" name="Rectangle 150"/>
+                <p:cNvSpPr/>
+                <p:nvPr/>
+              </p:nvSpPr>
+              <p:spPr>
+                <a:xfrm>
+                  <a:off x="1002575" y="1231726"/>
+                  <a:ext cx="838200" cy="838200"/>
+                </a:xfrm>
+                <a:prstGeom prst="rect">
+                  <a:avLst/>
+                </a:prstGeom>
+                <a:noFill/>
+                <a:ln>
+                  <a:noFill/>
+                </a:ln>
+              </p:spPr>
+              <p:style>
+                <a:lnRef idx="2">
+                  <a:schemeClr val="accent1">
+                    <a:shade val="50000"/>
+                  </a:schemeClr>
+                </a:lnRef>
+                <a:fillRef idx="1">
+                  <a:schemeClr val="accent1"/>
+                </a:fillRef>
+                <a:effectRef idx="0">
+                  <a:schemeClr val="accent1"/>
+                </a:effectRef>
+                <a:fontRef idx="minor">
+                  <a:schemeClr val="lt1"/>
+                </a:fontRef>
+              </p:style>
+              <p:txBody>
+                <a:bodyPr rtlCol="0" anchor="ctr"/>
+                <a:lstStyle/>
+                <a:p>
+                  <a:pPr algn="ctr"/>
+                  <a:endParaRPr lang="en-SG"/>
+                </a:p>
+              </p:txBody>
+            </p:sp>
+            <p:sp>
+              <p:nvSpPr>
+                <p:cNvPr id="152" name="Rectangle 4"/>
+                <p:cNvSpPr/>
+                <p:nvPr/>
+              </p:nvSpPr>
+              <p:spPr>
+                <a:xfrm rot="16200000">
+                  <a:off x="1071530" y="1304929"/>
+                  <a:ext cx="700291" cy="690781"/>
+                </a:xfrm>
+                <a:custGeom>
+                  <a:avLst/>
+                  <a:gdLst/>
+                  <a:ahLst/>
+                  <a:cxnLst/>
+                  <a:rect l="l" t="t" r="r" b="b"/>
+                  <a:pathLst>
+                    <a:path w="1752603" h="1752600">
+                      <a:moveTo>
+                        <a:pt x="533400" y="0"/>
+                      </a:moveTo>
+                      <a:lnTo>
+                        <a:pt x="533403" y="0"/>
+                      </a:lnTo>
+                      <a:lnTo>
+                        <a:pt x="1066800" y="0"/>
+                      </a:lnTo>
+                      <a:lnTo>
+                        <a:pt x="1752603" y="0"/>
+                      </a:lnTo>
+                      <a:lnTo>
+                        <a:pt x="1752603" y="1752600"/>
+                      </a:lnTo>
+                      <a:lnTo>
+                        <a:pt x="1219203" y="1752600"/>
+                      </a:lnTo>
+                      <a:lnTo>
+                        <a:pt x="533403" y="1752600"/>
+                      </a:lnTo>
+                      <a:lnTo>
+                        <a:pt x="3" y="1752600"/>
+                      </a:lnTo>
+                      <a:lnTo>
+                        <a:pt x="3" y="533430"/>
+                      </a:lnTo>
+                      <a:cubicBezTo>
+                        <a:pt x="0" y="533420"/>
+                        <a:pt x="0" y="533410"/>
+                        <a:pt x="0" y="533400"/>
+                      </a:cubicBezTo>
+                      <a:cubicBezTo>
+                        <a:pt x="0" y="238811"/>
+                        <a:pt x="238811" y="0"/>
+                        <a:pt x="533400" y="0"/>
+                      </a:cubicBezTo>
+                      <a:close/>
+                    </a:path>
+                  </a:pathLst>
+                </a:custGeom>
+                <a:noFill/>
+                <a:ln w="76200" cmpd="sng">
+                  <a:solidFill>
+                    <a:srgbClr val="0070C0"/>
+                  </a:solidFill>
+                  <a:miter lim="800000"/>
+                </a:ln>
+              </p:spPr>
+              <p:style>
+                <a:lnRef idx="2">
+                  <a:schemeClr val="accent1">
+                    <a:shade val="50000"/>
+                  </a:schemeClr>
+                </a:lnRef>
+                <a:fillRef idx="1">
+                  <a:schemeClr val="accent1"/>
+                </a:fillRef>
+                <a:effectRef idx="0">
+                  <a:schemeClr val="accent1"/>
+                </a:effectRef>
+                <a:fontRef idx="minor">
+                  <a:schemeClr val="lt1"/>
+                </a:fontRef>
+              </p:style>
+              <p:txBody>
+                <a:bodyPr rtlCol="0" anchor="ctr"/>
+                <a:lstStyle/>
+                <a:p>
+                  <a:pPr algn="ctr"/>
+                  <a:endParaRPr lang="en-US"/>
+                </a:p>
+              </p:txBody>
+            </p:sp>
+          </p:grpSp>
+          <p:sp>
+            <p:nvSpPr>
+              <p:cNvPr id="120" name="Rectangle 119"/>
+              <p:cNvSpPr/>
+              <p:nvPr/>
+            </p:nvSpPr>
+            <p:spPr>
+              <a:xfrm rot="10800000">
+                <a:off x="1076119" y="1552453"/>
+                <a:ext cx="549071" cy="549822"/>
+              </a:xfrm>
+              <a:prstGeom prst="rect">
+                <a:avLst/>
+              </a:prstGeom>
+              <a:noFill/>
+              <a:ln>
+                <a:noFill/>
+              </a:ln>
+            </p:spPr>
+            <p:style>
+              <a:lnRef idx="2">
+                <a:schemeClr val="accent1">
+                  <a:shade val="50000"/>
+                </a:schemeClr>
+              </a:lnRef>
+              <a:fillRef idx="1">
+                <a:schemeClr val="accent1"/>
+              </a:fillRef>
+              <a:effectRef idx="0">
+                <a:schemeClr val="accent1"/>
+              </a:effectRef>
+              <a:fontRef idx="minor">
+                <a:schemeClr val="lt1"/>
+              </a:fontRef>
+            </p:style>
+            <p:txBody>
+              <a:bodyPr wrap="none" lIns="0" tIns="0" rIns="0" bIns="0" rtlCol="0" anchor="ctr"/>
+              <a:lstStyle/>
+              <a:p>
+                <a:pPr algn="ctr"/>
+                <a:endParaRPr lang="en-US" b="1"/>
+              </a:p>
+            </p:txBody>
+          </p:sp>
+        </p:grpSp>
+        <p:grpSp>
+          <p:nvGrpSpPr>
+            <p:cNvPr id="13" name="Group 12">
+              <a:extLst>
+                <a:ext uri="{FF2B5EF4-FFF2-40B4-BE49-F238E27FC236}">
+                  <a16:creationId xmlns:a16="http://schemas.microsoft.com/office/drawing/2014/main" id="{B33874E5-7577-4917-9556-338BBB8CCA3B}"/>
+                </a:ext>
+              </a:extLst>
+            </p:cNvPr>
+            <p:cNvGrpSpPr/>
+            <p:nvPr/>
+          </p:nvGrpSpPr>
+          <p:grpSpPr>
+            <a:xfrm>
+              <a:off x="1132095" y="1558049"/>
+              <a:ext cx="467200" cy="524454"/>
+              <a:chOff x="2734828" y="1594806"/>
+              <a:chExt cx="467200" cy="524454"/>
+            </a:xfrm>
+          </p:grpSpPr>
+          <p:sp>
+            <p:nvSpPr>
+              <p:cNvPr id="154" name="Freeform: Shape 153">
+                <a:extLst>
+                  <a:ext uri="{FF2B5EF4-FFF2-40B4-BE49-F238E27FC236}">
+                    <a16:creationId xmlns:a16="http://schemas.microsoft.com/office/drawing/2014/main" id="{22D8410C-7850-4C5D-BF56-3D68074E77F9}"/>
+                  </a:ext>
+                </a:extLst>
+              </p:cNvPr>
+              <p:cNvSpPr/>
+              <p:nvPr/>
+            </p:nvSpPr>
+            <p:spPr>
+              <a:xfrm>
+                <a:off x="2734828" y="1648241"/>
+                <a:ext cx="343904" cy="406070"/>
+              </a:xfrm>
+              <a:custGeom>
+                <a:avLst/>
+                <a:gdLst>
+                  <a:gd name="connsiteX0" fmla="*/ 0 w 343904"/>
+                  <a:gd name="connsiteY0" fmla="*/ 0 h 406070"/>
+                  <a:gd name="connsiteX1" fmla="*/ 58393 w 343904"/>
+                  <a:gd name="connsiteY1" fmla="*/ 0 h 406070"/>
+                  <a:gd name="connsiteX2" fmla="*/ 58393 w 343904"/>
+                  <a:gd name="connsiteY2" fmla="*/ 47861 h 406070"/>
+                  <a:gd name="connsiteX3" fmla="*/ 60123 w 343904"/>
+                  <a:gd name="connsiteY3" fmla="*/ 48921 h 406070"/>
+                  <a:gd name="connsiteX4" fmla="*/ 290910 w 343904"/>
+                  <a:gd name="connsiteY4" fmla="*/ 48921 h 406070"/>
+                  <a:gd name="connsiteX5" fmla="*/ 292640 w 343904"/>
+                  <a:gd name="connsiteY5" fmla="*/ 47861 h 406070"/>
+                  <a:gd name="connsiteX6" fmla="*/ 292640 w 343904"/>
+                  <a:gd name="connsiteY6" fmla="*/ 0 h 406070"/>
+                  <a:gd name="connsiteX7" fmla="*/ 343904 w 343904"/>
+                  <a:gd name="connsiteY7" fmla="*/ 0 h 406070"/>
+                  <a:gd name="connsiteX8" fmla="*/ 343904 w 343904"/>
+                  <a:gd name="connsiteY8" fmla="*/ 131625 h 406070"/>
+                  <a:gd name="connsiteX9" fmla="*/ 324565 w 343904"/>
+                  <a:gd name="connsiteY9" fmla="*/ 131625 h 406070"/>
+                  <a:gd name="connsiteX10" fmla="*/ 324240 w 343904"/>
+                  <a:gd name="connsiteY10" fmla="*/ 131300 h 406070"/>
+                  <a:gd name="connsiteX11" fmla="*/ 169327 w 343904"/>
+                  <a:gd name="connsiteY11" fmla="*/ 131300 h 406070"/>
+                  <a:gd name="connsiteX12" fmla="*/ 169327 w 343904"/>
+                  <a:gd name="connsiteY12" fmla="*/ 406070 h 406070"/>
+                  <a:gd name="connsiteX13" fmla="*/ 0 w 343904"/>
+                  <a:gd name="connsiteY13" fmla="*/ 406070 h 406070"/>
+                </a:gdLst>
+                <a:ahLst/>
+                <a:cxnLst>
+                  <a:cxn ang="0">
+                    <a:pos x="connsiteX0" y="connsiteY0"/>
+                  </a:cxn>
+                  <a:cxn ang="0">
+                    <a:pos x="connsiteX1" y="connsiteY1"/>
+                  </a:cxn>
+                  <a:cxn ang="0">
+                    <a:pos x="connsiteX2" y="connsiteY2"/>
+                  </a:cxn>
+                  <a:cxn ang="0">
+                    <a:pos x="connsiteX3" y="connsiteY3"/>
+                  </a:cxn>
+                  <a:cxn ang="0">
+                    <a:pos x="connsiteX4" y="connsiteY4"/>
+                  </a:cxn>
+                  <a:cxn ang="0">
+                    <a:pos x="connsiteX5" y="connsiteY5"/>
+                  </a:cxn>
+                  <a:cxn ang="0">
+                    <a:pos x="connsiteX6" y="connsiteY6"/>
+                  </a:cxn>
+                  <a:cxn ang="0">
+                    <a:pos x="connsiteX7" y="connsiteY7"/>
+                  </a:cxn>
+                  <a:cxn ang="0">
+                    <a:pos x="connsiteX8" y="connsiteY8"/>
+                  </a:cxn>
+                  <a:cxn ang="0">
+                    <a:pos x="connsiteX9" y="connsiteY9"/>
+                  </a:cxn>
+                  <a:cxn ang="0">
+                    <a:pos x="connsiteX10" y="connsiteY10"/>
+                  </a:cxn>
+                  <a:cxn ang="0">
+                    <a:pos x="connsiteX11" y="connsiteY11"/>
+                  </a:cxn>
+                  <a:cxn ang="0">
+                    <a:pos x="connsiteX12" y="connsiteY12"/>
+                  </a:cxn>
+                  <a:cxn ang="0">
+                    <a:pos x="connsiteX13" y="connsiteY13"/>
+                  </a:cxn>
+                </a:cxnLst>
+                <a:rect l="l" t="t" r="r" b="b"/>
+                <a:pathLst>
+                  <a:path w="343904" h="406070">
+                    <a:moveTo>
+                      <a:pt x="0" y="0"/>
+                    </a:moveTo>
+                    <a:lnTo>
+                      <a:pt x="58393" y="0"/>
+                    </a:lnTo>
+                    <a:lnTo>
+                      <a:pt x="58393" y="47861"/>
+                    </a:lnTo>
+                    <a:cubicBezTo>
+                      <a:pt x="58393" y="48223"/>
+                      <a:pt x="58507" y="48580"/>
+                      <a:pt x="60123" y="48921"/>
+                    </a:cubicBezTo>
+                    <a:lnTo>
+                      <a:pt x="290910" y="48921"/>
+                    </a:lnTo>
+                    <a:lnTo>
+                      <a:pt x="292640" y="47861"/>
+                    </a:lnTo>
+                    <a:lnTo>
+                      <a:pt x="292640" y="0"/>
+                    </a:lnTo>
+                    <a:lnTo>
+                      <a:pt x="343904" y="0"/>
+                    </a:lnTo>
+                    <a:lnTo>
+                      <a:pt x="343904" y="131625"/>
+                    </a:lnTo>
+                    <a:lnTo>
+                      <a:pt x="324565" y="131625"/>
+                    </a:lnTo>
+                    <a:lnTo>
+                      <a:pt x="324240" y="131300"/>
+                    </a:lnTo>
+                    <a:lnTo>
+                      <a:pt x="169327" y="131300"/>
+                    </a:lnTo>
+                    <a:lnTo>
+                      <a:pt x="169327" y="406070"/>
+                    </a:lnTo>
+                    <a:lnTo>
+                      <a:pt x="0" y="406070"/>
+                    </a:lnTo>
+                    <a:close/>
+                  </a:path>
+                </a:pathLst>
+              </a:custGeom>
+              <a:solidFill>
+                <a:srgbClr val="F79646"/>
+              </a:solidFill>
+              <a:ln>
+                <a:noFill/>
+              </a:ln>
+            </p:spPr>
+            <p:style>
+              <a:lnRef idx="2">
+                <a:schemeClr val="accent1">
+                  <a:shade val="50000"/>
+                </a:schemeClr>
+              </a:lnRef>
+              <a:fillRef idx="1">
+                <a:schemeClr val="accent1"/>
+              </a:fillRef>
+              <a:effectRef idx="0">
+                <a:schemeClr val="accent1"/>
+              </a:effectRef>
+              <a:fontRef idx="minor">
+                <a:schemeClr val="lt1"/>
+              </a:fontRef>
+            </p:style>
+            <p:txBody>
+              <a:bodyPr wrap="square" rtlCol="0" anchor="ctr">
+                <a:noAutofit/>
+              </a:bodyPr>
+              <a:lstStyle/>
+              <a:p>
+                <a:pPr algn="ctr"/>
+                <a:endParaRPr lang="en-US"/>
+              </a:p>
+            </p:txBody>
+          </p:sp>
+          <p:sp>
+            <p:nvSpPr>
+              <p:cNvPr id="155" name="Rounded Rectangle 227">
+                <a:extLst>
+                  <a:ext uri="{FF2B5EF4-FFF2-40B4-BE49-F238E27FC236}">
+                    <a16:creationId xmlns:a16="http://schemas.microsoft.com/office/drawing/2014/main" id="{F53D5A38-394D-4127-8CBC-601AB5541622}"/>
+                  </a:ext>
+                </a:extLst>
+              </p:cNvPr>
+              <p:cNvSpPr/>
+              <p:nvPr/>
+            </p:nvSpPr>
+            <p:spPr>
+              <a:xfrm rot="10800000">
+                <a:off x="2813461" y="1594806"/>
+                <a:ext cx="193468" cy="83559"/>
+              </a:xfrm>
+              <a:custGeom>
+                <a:avLst/>
+                <a:gdLst/>
+                <a:ahLst/>
+                <a:cxnLst/>
+                <a:rect l="l" t="t" r="r" b="b"/>
+                <a:pathLst>
+                  <a:path w="286327" h="1000124">
+                    <a:moveTo>
+                      <a:pt x="2115" y="0"/>
+                    </a:moveTo>
+                    <a:lnTo>
+                      <a:pt x="284212" y="0"/>
+                    </a:lnTo>
+                    <a:cubicBezTo>
+                      <a:pt x="286188" y="3367"/>
+                      <a:pt x="286327" y="6905"/>
+                      <a:pt x="286327" y="10476"/>
+                    </a:cubicBezTo>
+                    <a:lnTo>
+                      <a:pt x="286327" y="712825"/>
+                    </a:lnTo>
+                    <a:cubicBezTo>
+                      <a:pt x="286327" y="772047"/>
+                      <a:pt x="247915" y="822299"/>
+                      <a:pt x="194109" y="838409"/>
+                    </a:cubicBezTo>
+                    <a:cubicBezTo>
+                      <a:pt x="194108" y="875332"/>
+                      <a:pt x="194108" y="912256"/>
+                      <a:pt x="194108" y="949179"/>
+                    </a:cubicBezTo>
+                    <a:cubicBezTo>
+                      <a:pt x="194108" y="977315"/>
+                      <a:pt x="171299" y="1000124"/>
+                      <a:pt x="143163" y="1000124"/>
+                    </a:cubicBezTo>
+                    <a:lnTo>
+                      <a:pt x="143164" y="1000123"/>
+                    </a:lnTo>
+                    <a:cubicBezTo>
+                      <a:pt x="115028" y="1000123"/>
+                      <a:pt x="92219" y="977314"/>
+                      <a:pt x="92219" y="949178"/>
+                    </a:cubicBezTo>
+                    <a:lnTo>
+                      <a:pt x="92219" y="838409"/>
+                    </a:lnTo>
+                    <a:cubicBezTo>
+                      <a:pt x="38413" y="822299"/>
+                      <a:pt x="0" y="772048"/>
+                      <a:pt x="0" y="712825"/>
+                    </a:cubicBezTo>
+                    <a:lnTo>
+                      <a:pt x="0" y="10476"/>
+                    </a:lnTo>
+                    <a:close/>
+                  </a:path>
+                </a:pathLst>
+              </a:custGeom>
+              <a:solidFill>
+                <a:srgbClr val="F79646"/>
+              </a:solidFill>
+              <a:ln w="19050">
+                <a:noFill/>
+              </a:ln>
+            </p:spPr>
+            <p:style>
+              <a:lnRef idx="2">
+                <a:schemeClr val="accent1">
+                  <a:shade val="50000"/>
+                </a:schemeClr>
+              </a:lnRef>
+              <a:fillRef idx="1">
+                <a:schemeClr val="accent1"/>
+              </a:fillRef>
+              <a:effectRef idx="0">
+                <a:schemeClr val="accent1"/>
+              </a:effectRef>
+              <a:fontRef idx="minor">
+                <a:schemeClr val="lt1"/>
+              </a:fontRef>
+            </p:style>
+            <p:txBody>
+              <a:bodyPr rtlCol="0" anchor="ctr"/>
+              <a:lstStyle/>
+              <a:p>
+                <a:pPr algn="ctr"/>
+                <a:endParaRPr lang="en-SG"/>
+              </a:p>
+            </p:txBody>
+          </p:sp>
+          <p:sp>
+            <p:nvSpPr>
+              <p:cNvPr id="156" name="Freeform: Shape 155">
+                <a:extLst>
+                  <a:ext uri="{FF2B5EF4-FFF2-40B4-BE49-F238E27FC236}">
+                    <a16:creationId xmlns:a16="http://schemas.microsoft.com/office/drawing/2014/main" id="{1FDECEA1-4E8C-4CBA-AD15-6ECE6B4865AE}"/>
+                  </a:ext>
+                </a:extLst>
+              </p:cNvPr>
+              <p:cNvSpPr/>
+              <p:nvPr/>
+            </p:nvSpPr>
+            <p:spPr>
+              <a:xfrm rot="10800000" flipH="1">
+                <a:off x="2926376" y="1798263"/>
+                <a:ext cx="263060" cy="320997"/>
+              </a:xfrm>
+              <a:custGeom>
+                <a:avLst/>
+                <a:gdLst>
+                  <a:gd name="connsiteX0" fmla="*/ 0 w 263060"/>
+                  <a:gd name="connsiteY0" fmla="*/ 320997 h 320997"/>
+                  <a:gd name="connsiteX1" fmla="*/ 143192 w 263060"/>
+                  <a:gd name="connsiteY1" fmla="*/ 320997 h 320997"/>
+                  <a:gd name="connsiteX2" fmla="*/ 166675 w 263060"/>
+                  <a:gd name="connsiteY2" fmla="*/ 224469 h 320997"/>
+                  <a:gd name="connsiteX3" fmla="*/ 167872 w 263060"/>
+                  <a:gd name="connsiteY3" fmla="*/ 224760 h 320997"/>
+                  <a:gd name="connsiteX4" fmla="*/ 167552 w 263060"/>
+                  <a:gd name="connsiteY4" fmla="*/ 223402 h 320997"/>
+                  <a:gd name="connsiteX5" fmla="*/ 263060 w 263060"/>
+                  <a:gd name="connsiteY5" fmla="*/ 200938 h 320997"/>
+                  <a:gd name="connsiteX6" fmla="*/ 263060 w 263060"/>
+                  <a:gd name="connsiteY6" fmla="*/ 0 h 320997"/>
+                  <a:gd name="connsiteX7" fmla="*/ 0 w 263060"/>
+                  <a:gd name="connsiteY7" fmla="*/ 0 h 320997"/>
+                </a:gdLst>
+                <a:ahLst/>
+                <a:cxnLst>
+                  <a:cxn ang="0">
+                    <a:pos x="connsiteX0" y="connsiteY0"/>
+                  </a:cxn>
+                  <a:cxn ang="0">
+                    <a:pos x="connsiteX1" y="connsiteY1"/>
+                  </a:cxn>
+                  <a:cxn ang="0">
+                    <a:pos x="connsiteX2" y="connsiteY2"/>
+                  </a:cxn>
+                  <a:cxn ang="0">
+                    <a:pos x="connsiteX3" y="connsiteY3"/>
+                  </a:cxn>
+                  <a:cxn ang="0">
+                    <a:pos x="connsiteX4" y="connsiteY4"/>
+                  </a:cxn>
+                  <a:cxn ang="0">
+                    <a:pos x="connsiteX5" y="connsiteY5"/>
+                  </a:cxn>
+                  <a:cxn ang="0">
+                    <a:pos x="connsiteX6" y="connsiteY6"/>
+                  </a:cxn>
+                  <a:cxn ang="0">
+                    <a:pos x="connsiteX7" y="connsiteY7"/>
+                  </a:cxn>
+                </a:cxnLst>
+                <a:rect l="l" t="t" r="r" b="b"/>
+                <a:pathLst>
+                  <a:path w="263060" h="320997">
+                    <a:moveTo>
+                      <a:pt x="0" y="320997"/>
+                    </a:moveTo>
+                    <a:lnTo>
+                      <a:pt x="143192" y="320997"/>
+                    </a:lnTo>
+                    <a:lnTo>
+                      <a:pt x="166675" y="224469"/>
+                    </a:lnTo>
+                    <a:lnTo>
+                      <a:pt x="167872" y="224760"/>
+                    </a:lnTo>
+                    <a:lnTo>
+                      <a:pt x="167552" y="223402"/>
+                    </a:lnTo>
+                    <a:lnTo>
+                      <a:pt x="263060" y="200938"/>
+                    </a:lnTo>
+                    <a:lnTo>
+                      <a:pt x="263060" y="0"/>
+                    </a:lnTo>
+                    <a:lnTo>
+                      <a:pt x="0" y="0"/>
+                    </a:lnTo>
+                    <a:close/>
+                  </a:path>
+                </a:pathLst>
+              </a:custGeom>
+              <a:solidFill>
+                <a:srgbClr val="0070C0"/>
+              </a:solidFill>
+              <a:ln>
+                <a:noFill/>
+              </a:ln>
+            </p:spPr>
+            <p:style>
+              <a:lnRef idx="2">
+                <a:schemeClr val="accent1"/>
+              </a:lnRef>
+              <a:fillRef idx="1">
+                <a:schemeClr val="lt1"/>
+              </a:fillRef>
+              <a:effectRef idx="0">
+                <a:schemeClr val="accent1"/>
+              </a:effectRef>
+              <a:fontRef idx="minor">
+                <a:schemeClr val="dk1"/>
+              </a:fontRef>
+            </p:style>
+            <p:txBody>
+              <a:bodyPr wrap="square" rtlCol="0" anchor="ctr">
+                <a:noAutofit/>
+              </a:bodyPr>
+              <a:lstStyle/>
+              <a:p>
+                <a:pPr algn="ctr"/>
+                <a:endParaRPr lang="en-US" dirty="0"/>
+              </a:p>
+            </p:txBody>
+          </p:sp>
+          <p:sp>
+            <p:nvSpPr>
+              <p:cNvPr id="157" name="Freeform: Shape 156">
+                <a:extLst>
+                  <a:ext uri="{FF2B5EF4-FFF2-40B4-BE49-F238E27FC236}">
+                    <a16:creationId xmlns:a16="http://schemas.microsoft.com/office/drawing/2014/main" id="{877F9CCE-1CE8-47EA-B437-B5FC528A4A07}"/>
+                  </a:ext>
+                </a:extLst>
+              </p:cNvPr>
+              <p:cNvSpPr/>
+              <p:nvPr/>
+            </p:nvSpPr>
+            <p:spPr>
+              <a:xfrm rot="794163">
+                <a:off x="3078696" y="1809562"/>
+                <a:ext cx="123332" cy="75934"/>
+              </a:xfrm>
+              <a:custGeom>
+                <a:avLst/>
+                <a:gdLst>
+                  <a:gd name="connsiteX0" fmla="*/ 0 w 144316"/>
+                  <a:gd name="connsiteY0" fmla="*/ 0 h 88854"/>
+                  <a:gd name="connsiteX1" fmla="*/ 144288 w 144316"/>
+                  <a:gd name="connsiteY1" fmla="*/ 88733 h 88854"/>
+                  <a:gd name="connsiteX2" fmla="*/ 144316 w 144316"/>
+                  <a:gd name="connsiteY2" fmla="*/ 88854 h 88854"/>
+                  <a:gd name="connsiteX3" fmla="*/ 45769 w 144316"/>
+                  <a:gd name="connsiteY3" fmla="*/ 88854 h 88854"/>
+                  <a:gd name="connsiteX4" fmla="*/ 45769 w 144316"/>
+                  <a:gd name="connsiteY4" fmla="*/ 87459 h 88854"/>
+                  <a:gd name="connsiteX5" fmla="*/ 44671 w 144316"/>
+                  <a:gd name="connsiteY5" fmla="*/ 88016 h 88854"/>
+                </a:gdLst>
+                <a:ahLst/>
+                <a:cxnLst>
+                  <a:cxn ang="0">
+                    <a:pos x="connsiteX0" y="connsiteY0"/>
+                  </a:cxn>
+                  <a:cxn ang="0">
+                    <a:pos x="connsiteX1" y="connsiteY1"/>
+                  </a:cxn>
+                  <a:cxn ang="0">
+                    <a:pos x="connsiteX2" y="connsiteY2"/>
+                  </a:cxn>
+                  <a:cxn ang="0">
+                    <a:pos x="connsiteX3" y="connsiteY3"/>
+                  </a:cxn>
+                  <a:cxn ang="0">
+                    <a:pos x="connsiteX4" y="connsiteY4"/>
+                  </a:cxn>
+                  <a:cxn ang="0">
+                    <a:pos x="connsiteX5" y="connsiteY5"/>
+                  </a:cxn>
+                </a:cxnLst>
+                <a:rect l="l" t="t" r="r" b="b"/>
+                <a:pathLst>
+                  <a:path w="144316" h="88854">
+                    <a:moveTo>
+                      <a:pt x="0" y="0"/>
+                    </a:moveTo>
+                    <a:lnTo>
+                      <a:pt x="144288" y="88733"/>
+                    </a:lnTo>
+                    <a:lnTo>
+                      <a:pt x="144316" y="88854"/>
+                    </a:lnTo>
+                    <a:lnTo>
+                      <a:pt x="45769" y="88854"/>
+                    </a:lnTo>
+                    <a:lnTo>
+                      <a:pt x="45769" y="87459"/>
+                    </a:lnTo>
+                    <a:lnTo>
+                      <a:pt x="44671" y="88016"/>
+                    </a:lnTo>
+                    <a:close/>
+                  </a:path>
+                </a:pathLst>
+              </a:custGeom>
+              <a:solidFill>
+                <a:srgbClr val="0070C0"/>
+              </a:solidFill>
+              <a:ln>
+                <a:noFill/>
+              </a:ln>
+            </p:spPr>
+            <p:style>
+              <a:lnRef idx="2">
+                <a:schemeClr val="accent1">
+                  <a:shade val="50000"/>
+                </a:schemeClr>
+              </a:lnRef>
+              <a:fillRef idx="1">
+                <a:schemeClr val="accent1"/>
+              </a:fillRef>
+              <a:effectRef idx="0">
+                <a:schemeClr val="accent1"/>
+              </a:effectRef>
+              <a:fontRef idx="minor">
+                <a:schemeClr val="lt1"/>
+              </a:fontRef>
+            </p:style>
+            <p:txBody>
+              <a:bodyPr rtlCol="0" anchor="ctr"/>
+              <a:lstStyle/>
+              <a:p>
+                <a:pPr algn="ctr"/>
+                <a:endParaRPr lang="en-US"/>
+              </a:p>
+            </p:txBody>
+          </p:sp>
+        </p:grpSp>
+      </p:grpSp>
     </p:spTree>
     <p:extLst>
       <p:ext uri="{BB962C8B-B14F-4D97-AF65-F5344CB8AC3E}">

</xml_diff>

<commit_message>
Remove white outlines from all lab icons (#1502)
</commit_message>
<xml_diff>
--- a/doc/icons/Icons-PasteLab.pptx
+++ b/doc/icons/Icons-PasteLab.pptx
@@ -221,7 +221,7 @@
           <a:p>
             <a:fld id="{6699ACB9-486C-4D62-A3A7-AF98E13EFDA3}" type="datetimeFigureOut">
               <a:rPr lang="en-US" smtClean="0"/>
-              <a:t>6/13/2017</a:t>
+              <a:t>7/6/2017</a:t>
             </a:fld>
             <a:endParaRPr lang="en-US"/>
           </a:p>
@@ -752,7 +752,7 @@
             <a:fld id="{1D8BD707-D9CF-40AE-B4C6-C98DA3205C09}" type="datetimeFigureOut">
               <a:rPr lang="en-US" smtClean="0"/>
               <a:pPr/>
-              <a:t>6/13/2017</a:t>
+              <a:t>7/6/2017</a:t>
             </a:fld>
             <a:endParaRPr lang="en-US"/>
           </a:p>
@@ -917,7 +917,7 @@
             <a:fld id="{1D8BD707-D9CF-40AE-B4C6-C98DA3205C09}" type="datetimeFigureOut">
               <a:rPr lang="en-US" smtClean="0"/>
               <a:pPr/>
-              <a:t>6/13/2017</a:t>
+              <a:t>7/6/2017</a:t>
             </a:fld>
             <a:endParaRPr lang="en-US"/>
           </a:p>
@@ -1092,7 +1092,7 @@
             <a:fld id="{1D8BD707-D9CF-40AE-B4C6-C98DA3205C09}" type="datetimeFigureOut">
               <a:rPr lang="en-US" smtClean="0"/>
               <a:pPr/>
-              <a:t>6/13/2017</a:t>
+              <a:t>7/6/2017</a:t>
             </a:fld>
             <a:endParaRPr lang="en-US"/>
           </a:p>
@@ -1257,7 +1257,7 @@
             <a:fld id="{1D8BD707-D9CF-40AE-B4C6-C98DA3205C09}" type="datetimeFigureOut">
               <a:rPr lang="en-US" smtClean="0"/>
               <a:pPr/>
-              <a:t>6/13/2017</a:t>
+              <a:t>7/6/2017</a:t>
             </a:fld>
             <a:endParaRPr lang="en-US"/>
           </a:p>
@@ -1499,7 +1499,7 @@
             <a:fld id="{1D8BD707-D9CF-40AE-B4C6-C98DA3205C09}" type="datetimeFigureOut">
               <a:rPr lang="en-US" smtClean="0"/>
               <a:pPr/>
-              <a:t>6/13/2017</a:t>
+              <a:t>7/6/2017</a:t>
             </a:fld>
             <a:endParaRPr lang="en-US"/>
           </a:p>
@@ -1781,7 +1781,7 @@
             <a:fld id="{1D8BD707-D9CF-40AE-B4C6-C98DA3205C09}" type="datetimeFigureOut">
               <a:rPr lang="en-US" smtClean="0"/>
               <a:pPr/>
-              <a:t>6/13/2017</a:t>
+              <a:t>7/6/2017</a:t>
             </a:fld>
             <a:endParaRPr lang="en-US"/>
           </a:p>
@@ -2197,7 +2197,7 @@
             <a:fld id="{1D8BD707-D9CF-40AE-B4C6-C98DA3205C09}" type="datetimeFigureOut">
               <a:rPr lang="en-US" smtClean="0"/>
               <a:pPr/>
-              <a:t>6/13/2017</a:t>
+              <a:t>7/6/2017</a:t>
             </a:fld>
             <a:endParaRPr lang="en-US"/>
           </a:p>
@@ -2311,7 +2311,7 @@
             <a:fld id="{1D8BD707-D9CF-40AE-B4C6-C98DA3205C09}" type="datetimeFigureOut">
               <a:rPr lang="en-US" smtClean="0"/>
               <a:pPr/>
-              <a:t>6/13/2017</a:t>
+              <a:t>7/6/2017</a:t>
             </a:fld>
             <a:endParaRPr lang="en-US"/>
           </a:p>
@@ -2403,7 +2403,7 @@
             <a:fld id="{1D8BD707-D9CF-40AE-B4C6-C98DA3205C09}" type="datetimeFigureOut">
               <a:rPr lang="en-US" smtClean="0"/>
               <a:pPr/>
-              <a:t>6/13/2017</a:t>
+              <a:t>7/6/2017</a:t>
             </a:fld>
             <a:endParaRPr lang="en-US"/>
           </a:p>
@@ -2675,7 +2675,7 @@
             <a:fld id="{1D8BD707-D9CF-40AE-B4C6-C98DA3205C09}" type="datetimeFigureOut">
               <a:rPr lang="en-US" smtClean="0"/>
               <a:pPr/>
-              <a:t>6/13/2017</a:t>
+              <a:t>7/6/2017</a:t>
             </a:fld>
             <a:endParaRPr lang="en-US"/>
           </a:p>
@@ -2924,7 +2924,7 @@
             <a:fld id="{1D8BD707-D9CF-40AE-B4C6-C98DA3205C09}" type="datetimeFigureOut">
               <a:rPr lang="en-US" smtClean="0"/>
               <a:pPr/>
-              <a:t>6/13/2017</a:t>
+              <a:t>7/6/2017</a:t>
             </a:fld>
             <a:endParaRPr lang="en-US"/>
           </a:p>
@@ -3132,7 +3132,7 @@
             <a:fld id="{1D8BD707-D9CF-40AE-B4C6-C98DA3205C09}" type="datetimeFigureOut">
               <a:rPr lang="en-US" smtClean="0"/>
               <a:pPr/>
-              <a:t>6/13/2017</a:t>
+              <a:t>7/6/2017</a:t>
             </a:fld>
             <a:endParaRPr lang="en-US"/>
           </a:p>
@@ -4144,875 +4144,6 @@
           </a:p>
         </p:txBody>
       </p:sp>
-      <p:grpSp>
-        <p:nvGrpSpPr>
-          <p:cNvPr id="2" name="Group 1"/>
-          <p:cNvGrpSpPr/>
-          <p:nvPr/>
-        </p:nvGrpSpPr>
-        <p:grpSpPr>
-          <a:xfrm>
-            <a:off x="931555" y="1414827"/>
-            <a:ext cx="838200" cy="838200"/>
-            <a:chOff x="931555" y="1414827"/>
-            <a:chExt cx="838200" cy="838200"/>
-          </a:xfrm>
-        </p:grpSpPr>
-        <p:grpSp>
-          <p:nvGrpSpPr>
-            <p:cNvPr id="150" name="Group 149"/>
-            <p:cNvGrpSpPr/>
-            <p:nvPr/>
-          </p:nvGrpSpPr>
-          <p:grpSpPr>
-            <a:xfrm>
-              <a:off x="931555" y="1414827"/>
-              <a:ext cx="838200" cy="838200"/>
-              <a:chOff x="1002575" y="1231726"/>
-              <a:chExt cx="838200" cy="838200"/>
-            </a:xfrm>
-          </p:grpSpPr>
-          <p:sp>
-            <p:nvSpPr>
-              <p:cNvPr id="151" name="Rectangle 150"/>
-              <p:cNvSpPr/>
-              <p:nvPr/>
-            </p:nvSpPr>
-            <p:spPr>
-              <a:xfrm>
-                <a:off x="1002575" y="1231726"/>
-                <a:ext cx="838200" cy="838200"/>
-              </a:xfrm>
-              <a:prstGeom prst="rect">
-                <a:avLst/>
-              </a:prstGeom>
-              <a:noFill/>
-              <a:ln>
-                <a:noFill/>
-              </a:ln>
-            </p:spPr>
-            <p:style>
-              <a:lnRef idx="2">
-                <a:schemeClr val="accent1">
-                  <a:shade val="50000"/>
-                </a:schemeClr>
-              </a:lnRef>
-              <a:fillRef idx="1">
-                <a:schemeClr val="accent1"/>
-              </a:fillRef>
-              <a:effectRef idx="0">
-                <a:schemeClr val="accent1"/>
-              </a:effectRef>
-              <a:fontRef idx="minor">
-                <a:schemeClr val="lt1"/>
-              </a:fontRef>
-            </p:style>
-            <p:txBody>
-              <a:bodyPr rtlCol="0" anchor="ctr"/>
-              <a:lstStyle/>
-              <a:p>
-                <a:pPr algn="ctr"/>
-                <a:endParaRPr lang="en-SG"/>
-              </a:p>
-            </p:txBody>
-          </p:sp>
-          <p:sp>
-            <p:nvSpPr>
-              <p:cNvPr id="152" name="Rectangle 4"/>
-              <p:cNvSpPr/>
-              <p:nvPr/>
-            </p:nvSpPr>
-            <p:spPr>
-              <a:xfrm rot="16200000">
-                <a:off x="1071530" y="1304929"/>
-                <a:ext cx="700291" cy="690781"/>
-              </a:xfrm>
-              <a:custGeom>
-                <a:avLst/>
-                <a:gdLst/>
-                <a:ahLst/>
-                <a:cxnLst/>
-                <a:rect l="l" t="t" r="r" b="b"/>
-                <a:pathLst>
-                  <a:path w="1752603" h="1752600">
-                    <a:moveTo>
-                      <a:pt x="533400" y="0"/>
-                    </a:moveTo>
-                    <a:lnTo>
-                      <a:pt x="533403" y="0"/>
-                    </a:lnTo>
-                    <a:lnTo>
-                      <a:pt x="1066800" y="0"/>
-                    </a:lnTo>
-                    <a:lnTo>
-                      <a:pt x="1752603" y="0"/>
-                    </a:lnTo>
-                    <a:lnTo>
-                      <a:pt x="1752603" y="1752600"/>
-                    </a:lnTo>
-                    <a:lnTo>
-                      <a:pt x="1219203" y="1752600"/>
-                    </a:lnTo>
-                    <a:lnTo>
-                      <a:pt x="533403" y="1752600"/>
-                    </a:lnTo>
-                    <a:lnTo>
-                      <a:pt x="3" y="1752600"/>
-                    </a:lnTo>
-                    <a:lnTo>
-                      <a:pt x="3" y="533430"/>
-                    </a:lnTo>
-                    <a:cubicBezTo>
-                      <a:pt x="0" y="533420"/>
-                      <a:pt x="0" y="533410"/>
-                      <a:pt x="0" y="533400"/>
-                    </a:cubicBezTo>
-                    <a:cubicBezTo>
-                      <a:pt x="0" y="238811"/>
-                      <a:pt x="238811" y="0"/>
-                      <a:pt x="533400" y="0"/>
-                    </a:cubicBezTo>
-                    <a:close/>
-                  </a:path>
-                </a:pathLst>
-              </a:custGeom>
-              <a:noFill/>
-              <a:ln w="76200" cmpd="sng">
-                <a:solidFill>
-                  <a:srgbClr val="0070C0"/>
-                </a:solidFill>
-                <a:miter lim="800000"/>
-              </a:ln>
-            </p:spPr>
-            <p:style>
-              <a:lnRef idx="2">
-                <a:schemeClr val="accent1">
-                  <a:shade val="50000"/>
-                </a:schemeClr>
-              </a:lnRef>
-              <a:fillRef idx="1">
-                <a:schemeClr val="accent1"/>
-              </a:fillRef>
-              <a:effectRef idx="0">
-                <a:schemeClr val="accent1"/>
-              </a:effectRef>
-              <a:fontRef idx="minor">
-                <a:schemeClr val="lt1"/>
-              </a:fontRef>
-            </p:style>
-            <p:txBody>
-              <a:bodyPr rtlCol="0" anchor="ctr"/>
-              <a:lstStyle/>
-              <a:p>
-                <a:pPr algn="ctr"/>
-                <a:endParaRPr lang="en-US"/>
-              </a:p>
-            </p:txBody>
-          </p:sp>
-        </p:grpSp>
-        <p:grpSp>
-          <p:nvGrpSpPr>
-            <p:cNvPr id="114" name="Group 113"/>
-            <p:cNvGrpSpPr/>
-            <p:nvPr/>
-          </p:nvGrpSpPr>
-          <p:grpSpPr>
-            <a:xfrm>
-              <a:off x="1076119" y="1552453"/>
-              <a:ext cx="549071" cy="549822"/>
-              <a:chOff x="4180111" y="1375544"/>
-              <a:chExt cx="549071" cy="549822"/>
-            </a:xfrm>
-          </p:grpSpPr>
-          <p:grpSp>
-            <p:nvGrpSpPr>
-              <p:cNvPr id="119" name="Group 118"/>
-              <p:cNvGrpSpPr/>
-              <p:nvPr/>
-            </p:nvGrpSpPr>
-            <p:grpSpPr>
-              <a:xfrm>
-                <a:off x="4235574" y="1385216"/>
-                <a:ext cx="446467" cy="521728"/>
-                <a:chOff x="4821567" y="919204"/>
-                <a:chExt cx="446467" cy="521728"/>
-              </a:xfrm>
-            </p:grpSpPr>
-            <p:sp>
-              <p:nvSpPr>
-                <p:cNvPr id="121" name="Rectangle 120"/>
-                <p:cNvSpPr/>
-                <p:nvPr/>
-              </p:nvSpPr>
-              <p:spPr>
-                <a:xfrm>
-                  <a:off x="4821567" y="971454"/>
-                  <a:ext cx="343904" cy="406070"/>
-                </a:xfrm>
-                <a:prstGeom prst="rect">
-                  <a:avLst/>
-                </a:prstGeom>
-                <a:solidFill>
-                  <a:srgbClr val="F79646"/>
-                </a:solidFill>
-                <a:ln>
-                  <a:noFill/>
-                </a:ln>
-              </p:spPr>
-              <p:style>
-                <a:lnRef idx="2">
-                  <a:schemeClr val="accent1">
-                    <a:shade val="50000"/>
-                  </a:schemeClr>
-                </a:lnRef>
-                <a:fillRef idx="1">
-                  <a:schemeClr val="accent1"/>
-                </a:fillRef>
-                <a:effectRef idx="0">
-                  <a:schemeClr val="accent1"/>
-                </a:effectRef>
-                <a:fontRef idx="minor">
-                  <a:schemeClr val="lt1"/>
-                </a:fontRef>
-              </p:style>
-              <p:txBody>
-                <a:bodyPr rtlCol="0" anchor="ctr"/>
-                <a:lstStyle/>
-                <a:p>
-                  <a:pPr algn="ctr"/>
-                  <a:endParaRPr lang="en-US"/>
-                </a:p>
-              </p:txBody>
-            </p:sp>
-            <p:sp>
-              <p:nvSpPr>
-                <p:cNvPr id="122" name="Rectangle: Folded Corner 121"/>
-                <p:cNvSpPr/>
-                <p:nvPr/>
-              </p:nvSpPr>
-              <p:spPr>
-                <a:xfrm rot="10800000" flipH="1">
-                  <a:off x="4990894" y="1102754"/>
-                  <a:ext cx="277140" cy="338178"/>
-                </a:xfrm>
-                <a:prstGeom prst="foldedCorner">
-                  <a:avLst>
-                    <a:gd name="adj" fmla="val 44103"/>
-                  </a:avLst>
-                </a:prstGeom>
-                <a:solidFill>
-                  <a:srgbClr val="0070C0"/>
-                </a:solidFill>
-                <a:ln w="19050">
-                  <a:solidFill>
-                    <a:schemeClr val="bg1"/>
-                  </a:solidFill>
-                </a:ln>
-              </p:spPr>
-              <p:style>
-                <a:lnRef idx="2">
-                  <a:schemeClr val="accent1">
-                    <a:shade val="50000"/>
-                  </a:schemeClr>
-                </a:lnRef>
-                <a:fillRef idx="1">
-                  <a:schemeClr val="accent1"/>
-                </a:fillRef>
-                <a:effectRef idx="0">
-                  <a:schemeClr val="accent1"/>
-                </a:effectRef>
-                <a:fontRef idx="minor">
-                  <a:schemeClr val="lt1"/>
-                </a:fontRef>
-              </p:style>
-              <p:txBody>
-                <a:bodyPr rtlCol="0" anchor="ctr"/>
-                <a:lstStyle/>
-                <a:p>
-                  <a:pPr algn="ctr"/>
-                  <a:endParaRPr lang="en-US" dirty="0"/>
-                </a:p>
-              </p:txBody>
-            </p:sp>
-            <p:sp>
-              <p:nvSpPr>
-                <p:cNvPr id="123" name="Rounded Rectangle 227"/>
-                <p:cNvSpPr/>
-                <p:nvPr/>
-              </p:nvSpPr>
-              <p:spPr>
-                <a:xfrm rot="10800000">
-                  <a:off x="4879960" y="919204"/>
-                  <a:ext cx="234247" cy="101171"/>
-                </a:xfrm>
-                <a:custGeom>
-                  <a:avLst/>
-                  <a:gdLst/>
-                  <a:ahLst/>
-                  <a:cxnLst/>
-                  <a:rect l="l" t="t" r="r" b="b"/>
-                  <a:pathLst>
-                    <a:path w="286327" h="1000124">
-                      <a:moveTo>
-                        <a:pt x="2115" y="0"/>
-                      </a:moveTo>
-                      <a:lnTo>
-                        <a:pt x="284212" y="0"/>
-                      </a:lnTo>
-                      <a:cubicBezTo>
-                        <a:pt x="286188" y="3367"/>
-                        <a:pt x="286327" y="6905"/>
-                        <a:pt x="286327" y="10476"/>
-                      </a:cubicBezTo>
-                      <a:lnTo>
-                        <a:pt x="286327" y="712825"/>
-                      </a:lnTo>
-                      <a:cubicBezTo>
-                        <a:pt x="286327" y="772047"/>
-                        <a:pt x="247915" y="822299"/>
-                        <a:pt x="194109" y="838409"/>
-                      </a:cubicBezTo>
-                      <a:cubicBezTo>
-                        <a:pt x="194108" y="875332"/>
-                        <a:pt x="194108" y="912256"/>
-                        <a:pt x="194108" y="949179"/>
-                      </a:cubicBezTo>
-                      <a:cubicBezTo>
-                        <a:pt x="194108" y="977315"/>
-                        <a:pt x="171299" y="1000124"/>
-                        <a:pt x="143163" y="1000124"/>
-                      </a:cubicBezTo>
-                      <a:lnTo>
-                        <a:pt x="143164" y="1000123"/>
-                      </a:lnTo>
-                      <a:cubicBezTo>
-                        <a:pt x="115028" y="1000123"/>
-                        <a:pt x="92219" y="977314"/>
-                        <a:pt x="92219" y="949178"/>
-                      </a:cubicBezTo>
-                      <a:lnTo>
-                        <a:pt x="92219" y="838409"/>
-                      </a:lnTo>
-                      <a:cubicBezTo>
-                        <a:pt x="38413" y="822299"/>
-                        <a:pt x="0" y="772048"/>
-                        <a:pt x="0" y="712825"/>
-                      </a:cubicBezTo>
-                      <a:lnTo>
-                        <a:pt x="0" y="10476"/>
-                      </a:lnTo>
-                      <a:close/>
-                    </a:path>
-                  </a:pathLst>
-                </a:custGeom>
-                <a:solidFill>
-                  <a:srgbClr val="F79646"/>
-                </a:solidFill>
-                <a:ln w="19050">
-                  <a:solidFill>
-                    <a:schemeClr val="bg1"/>
-                  </a:solidFill>
-                </a:ln>
-              </p:spPr>
-              <p:style>
-                <a:lnRef idx="2">
-                  <a:schemeClr val="accent1">
-                    <a:shade val="50000"/>
-                  </a:schemeClr>
-                </a:lnRef>
-                <a:fillRef idx="1">
-                  <a:schemeClr val="accent1"/>
-                </a:fillRef>
-                <a:effectRef idx="0">
-                  <a:schemeClr val="accent1"/>
-                </a:effectRef>
-                <a:fontRef idx="minor">
-                  <a:schemeClr val="lt1"/>
-                </a:fontRef>
-              </p:style>
-              <p:txBody>
-                <a:bodyPr rtlCol="0" anchor="ctr"/>
-                <a:lstStyle/>
-                <a:p>
-                  <a:pPr algn="ctr"/>
-                  <a:endParaRPr lang="en-SG"/>
-                </a:p>
-              </p:txBody>
-            </p:sp>
-          </p:grpSp>
-          <p:sp>
-            <p:nvSpPr>
-              <p:cNvPr id="120" name="Rectangle 119"/>
-              <p:cNvSpPr/>
-              <p:nvPr/>
-            </p:nvSpPr>
-            <p:spPr>
-              <a:xfrm rot="10800000">
-                <a:off x="4180111" y="1375544"/>
-                <a:ext cx="549071" cy="549822"/>
-              </a:xfrm>
-              <a:prstGeom prst="rect">
-                <a:avLst/>
-              </a:prstGeom>
-              <a:noFill/>
-              <a:ln>
-                <a:noFill/>
-              </a:ln>
-            </p:spPr>
-            <p:style>
-              <a:lnRef idx="2">
-                <a:schemeClr val="accent1">
-                  <a:shade val="50000"/>
-                </a:schemeClr>
-              </a:lnRef>
-              <a:fillRef idx="1">
-                <a:schemeClr val="accent1"/>
-              </a:fillRef>
-              <a:effectRef idx="0">
-                <a:schemeClr val="accent1"/>
-              </a:effectRef>
-              <a:fontRef idx="minor">
-                <a:schemeClr val="lt1"/>
-              </a:fontRef>
-            </p:style>
-            <p:txBody>
-              <a:bodyPr wrap="none" lIns="0" tIns="0" rIns="0" bIns="0" rtlCol="0" anchor="ctr"/>
-              <a:lstStyle/>
-              <a:p>
-                <a:pPr algn="ctr"/>
-                <a:endParaRPr lang="en-US" b="1"/>
-              </a:p>
-            </p:txBody>
-          </p:sp>
-        </p:grpSp>
-      </p:grpSp>
-      <p:grpSp>
-        <p:nvGrpSpPr>
-          <p:cNvPr id="125" name="Group 124"/>
-          <p:cNvGrpSpPr/>
-          <p:nvPr/>
-        </p:nvGrpSpPr>
-        <p:grpSpPr>
-          <a:xfrm>
-            <a:off x="1943693" y="1414827"/>
-            <a:ext cx="838200" cy="838200"/>
-            <a:chOff x="1002575" y="1231726"/>
-            <a:chExt cx="838200" cy="838200"/>
-          </a:xfrm>
-        </p:grpSpPr>
-        <p:sp>
-          <p:nvSpPr>
-            <p:cNvPr id="126" name="Rectangle 125"/>
-            <p:cNvSpPr/>
-            <p:nvPr/>
-          </p:nvSpPr>
-          <p:spPr>
-            <a:xfrm>
-              <a:off x="1002575" y="1231726"/>
-              <a:ext cx="838200" cy="838200"/>
-            </a:xfrm>
-            <a:prstGeom prst="rect">
-              <a:avLst/>
-            </a:prstGeom>
-            <a:noFill/>
-            <a:ln>
-              <a:noFill/>
-            </a:ln>
-          </p:spPr>
-          <p:style>
-            <a:lnRef idx="2">
-              <a:schemeClr val="accent1">
-                <a:shade val="50000"/>
-              </a:schemeClr>
-            </a:lnRef>
-            <a:fillRef idx="1">
-              <a:schemeClr val="accent1"/>
-            </a:fillRef>
-            <a:effectRef idx="0">
-              <a:schemeClr val="accent1"/>
-            </a:effectRef>
-            <a:fontRef idx="minor">
-              <a:schemeClr val="lt1"/>
-            </a:fontRef>
-          </p:style>
-          <p:txBody>
-            <a:bodyPr rtlCol="0" anchor="ctr"/>
-            <a:lstStyle/>
-            <a:p>
-              <a:pPr algn="ctr"/>
-              <a:endParaRPr lang="en-SG"/>
-            </a:p>
-          </p:txBody>
-        </p:sp>
-        <p:sp>
-          <p:nvSpPr>
-            <p:cNvPr id="133" name="Rectangle 4"/>
-            <p:cNvSpPr/>
-            <p:nvPr/>
-          </p:nvSpPr>
-          <p:spPr>
-            <a:xfrm rot="16200000">
-              <a:off x="1071530" y="1304929"/>
-              <a:ext cx="700291" cy="690781"/>
-            </a:xfrm>
-            <a:custGeom>
-              <a:avLst/>
-              <a:gdLst/>
-              <a:ahLst/>
-              <a:cxnLst/>
-              <a:rect l="l" t="t" r="r" b="b"/>
-              <a:pathLst>
-                <a:path w="1752603" h="1752600">
-                  <a:moveTo>
-                    <a:pt x="533400" y="0"/>
-                  </a:moveTo>
-                  <a:lnTo>
-                    <a:pt x="533403" y="0"/>
-                  </a:lnTo>
-                  <a:lnTo>
-                    <a:pt x="1066800" y="0"/>
-                  </a:lnTo>
-                  <a:lnTo>
-                    <a:pt x="1752603" y="0"/>
-                  </a:lnTo>
-                  <a:lnTo>
-                    <a:pt x="1752603" y="1752600"/>
-                  </a:lnTo>
-                  <a:lnTo>
-                    <a:pt x="1219203" y="1752600"/>
-                  </a:lnTo>
-                  <a:lnTo>
-                    <a:pt x="533403" y="1752600"/>
-                  </a:lnTo>
-                  <a:lnTo>
-                    <a:pt x="3" y="1752600"/>
-                  </a:lnTo>
-                  <a:lnTo>
-                    <a:pt x="3" y="533430"/>
-                  </a:lnTo>
-                  <a:cubicBezTo>
-                    <a:pt x="0" y="533420"/>
-                    <a:pt x="0" y="533410"/>
-                    <a:pt x="0" y="533400"/>
-                  </a:cubicBezTo>
-                  <a:cubicBezTo>
-                    <a:pt x="0" y="238811"/>
-                    <a:pt x="238811" y="0"/>
-                    <a:pt x="533400" y="0"/>
-                  </a:cubicBezTo>
-                  <a:close/>
-                </a:path>
-              </a:pathLst>
-            </a:custGeom>
-            <a:noFill/>
-            <a:ln w="76200" cmpd="sng">
-              <a:solidFill>
-                <a:srgbClr val="0070C0"/>
-              </a:solidFill>
-              <a:miter lim="800000"/>
-            </a:ln>
-          </p:spPr>
-          <p:style>
-            <a:lnRef idx="2">
-              <a:schemeClr val="accent1">
-                <a:shade val="50000"/>
-              </a:schemeClr>
-            </a:lnRef>
-            <a:fillRef idx="1">
-              <a:schemeClr val="accent1"/>
-            </a:fillRef>
-            <a:effectRef idx="0">
-              <a:schemeClr val="accent1"/>
-            </a:effectRef>
-            <a:fontRef idx="minor">
-              <a:schemeClr val="lt1"/>
-            </a:fontRef>
-          </p:style>
-          <p:txBody>
-            <a:bodyPr rtlCol="0" anchor="ctr"/>
-            <a:lstStyle/>
-            <a:p>
-              <a:pPr algn="ctr"/>
-              <a:endParaRPr lang="en-US"/>
-            </a:p>
-          </p:txBody>
-        </p:sp>
-      </p:grpSp>
-      <p:grpSp>
-        <p:nvGrpSpPr>
-          <p:cNvPr id="134" name="Group 133"/>
-          <p:cNvGrpSpPr/>
-          <p:nvPr/>
-        </p:nvGrpSpPr>
-        <p:grpSpPr>
-          <a:xfrm>
-            <a:off x="2088257" y="1552453"/>
-            <a:ext cx="549071" cy="549822"/>
-            <a:chOff x="4180111" y="1375544"/>
-            <a:chExt cx="549071" cy="549822"/>
-          </a:xfrm>
-        </p:grpSpPr>
-        <p:grpSp>
-          <p:nvGrpSpPr>
-            <p:cNvPr id="135" name="Group 134"/>
-            <p:cNvGrpSpPr/>
-            <p:nvPr/>
-          </p:nvGrpSpPr>
-          <p:grpSpPr>
-            <a:xfrm>
-              <a:off x="4235574" y="1385216"/>
-              <a:ext cx="446467" cy="521728"/>
-              <a:chOff x="4821567" y="919204"/>
-              <a:chExt cx="446467" cy="521728"/>
-            </a:xfrm>
-          </p:grpSpPr>
-          <p:sp>
-            <p:nvSpPr>
-              <p:cNvPr id="137" name="Rectangle 136"/>
-              <p:cNvSpPr/>
-              <p:nvPr/>
-            </p:nvSpPr>
-            <p:spPr>
-              <a:xfrm>
-                <a:off x="4821567" y="971454"/>
-                <a:ext cx="343904" cy="406070"/>
-              </a:xfrm>
-              <a:prstGeom prst="rect">
-                <a:avLst/>
-              </a:prstGeom>
-              <a:solidFill>
-                <a:srgbClr val="0070C0"/>
-              </a:solidFill>
-              <a:ln>
-                <a:noFill/>
-              </a:ln>
-            </p:spPr>
-            <p:style>
-              <a:lnRef idx="2">
-                <a:schemeClr val="accent1">
-                  <a:shade val="50000"/>
-                </a:schemeClr>
-              </a:lnRef>
-              <a:fillRef idx="1">
-                <a:schemeClr val="accent1"/>
-              </a:fillRef>
-              <a:effectRef idx="0">
-                <a:schemeClr val="accent1"/>
-              </a:effectRef>
-              <a:fontRef idx="minor">
-                <a:schemeClr val="lt1"/>
-              </a:fontRef>
-            </p:style>
-            <p:txBody>
-              <a:bodyPr rtlCol="0" anchor="ctr"/>
-              <a:lstStyle/>
-              <a:p>
-                <a:pPr algn="ctr"/>
-                <a:endParaRPr lang="en-US"/>
-              </a:p>
-            </p:txBody>
-          </p:sp>
-          <p:sp>
-            <p:nvSpPr>
-              <p:cNvPr id="138" name="Rectangle: Folded Corner 137"/>
-              <p:cNvSpPr/>
-              <p:nvPr/>
-            </p:nvSpPr>
-            <p:spPr>
-              <a:xfrm rot="10800000" flipH="1">
-                <a:off x="4990894" y="1102754"/>
-                <a:ext cx="277140" cy="338178"/>
-              </a:xfrm>
-              <a:prstGeom prst="foldedCorner">
-                <a:avLst>
-                  <a:gd name="adj" fmla="val 44103"/>
-                </a:avLst>
-              </a:prstGeom>
-              <a:solidFill>
-                <a:schemeClr val="bg1"/>
-              </a:solidFill>
-              <a:ln>
-                <a:solidFill>
-                  <a:srgbClr val="F79646"/>
-                </a:solidFill>
-              </a:ln>
-            </p:spPr>
-            <p:style>
-              <a:lnRef idx="2">
-                <a:schemeClr val="accent1">
-                  <a:shade val="50000"/>
-                </a:schemeClr>
-              </a:lnRef>
-              <a:fillRef idx="1">
-                <a:schemeClr val="accent1"/>
-              </a:fillRef>
-              <a:effectRef idx="0">
-                <a:schemeClr val="accent1"/>
-              </a:effectRef>
-              <a:fontRef idx="minor">
-                <a:schemeClr val="lt1"/>
-              </a:fontRef>
-            </p:style>
-            <p:txBody>
-              <a:bodyPr rtlCol="0" anchor="ctr"/>
-              <a:lstStyle/>
-              <a:p>
-                <a:pPr algn="ctr"/>
-                <a:endParaRPr lang="en-US"/>
-              </a:p>
-            </p:txBody>
-          </p:sp>
-          <p:sp>
-            <p:nvSpPr>
-              <p:cNvPr id="139" name="Rounded Rectangle 227"/>
-              <p:cNvSpPr/>
-              <p:nvPr/>
-            </p:nvSpPr>
-            <p:spPr>
-              <a:xfrm rot="10800000">
-                <a:off x="4879960" y="919204"/>
-                <a:ext cx="234247" cy="101171"/>
-              </a:xfrm>
-              <a:custGeom>
-                <a:avLst/>
-                <a:gdLst/>
-                <a:ahLst/>
-                <a:cxnLst/>
-                <a:rect l="l" t="t" r="r" b="b"/>
-                <a:pathLst>
-                  <a:path w="286327" h="1000124">
-                    <a:moveTo>
-                      <a:pt x="2115" y="0"/>
-                    </a:moveTo>
-                    <a:lnTo>
-                      <a:pt x="284212" y="0"/>
-                    </a:lnTo>
-                    <a:cubicBezTo>
-                      <a:pt x="286188" y="3367"/>
-                      <a:pt x="286327" y="6905"/>
-                      <a:pt x="286327" y="10476"/>
-                    </a:cubicBezTo>
-                    <a:lnTo>
-                      <a:pt x="286327" y="712825"/>
-                    </a:lnTo>
-                    <a:cubicBezTo>
-                      <a:pt x="286327" y="772047"/>
-                      <a:pt x="247915" y="822299"/>
-                      <a:pt x="194109" y="838409"/>
-                    </a:cubicBezTo>
-                    <a:cubicBezTo>
-                      <a:pt x="194108" y="875332"/>
-                      <a:pt x="194108" y="912256"/>
-                      <a:pt x="194108" y="949179"/>
-                    </a:cubicBezTo>
-                    <a:cubicBezTo>
-                      <a:pt x="194108" y="977315"/>
-                      <a:pt x="171299" y="1000124"/>
-                      <a:pt x="143163" y="1000124"/>
-                    </a:cubicBezTo>
-                    <a:lnTo>
-                      <a:pt x="143164" y="1000123"/>
-                    </a:lnTo>
-                    <a:cubicBezTo>
-                      <a:pt x="115028" y="1000123"/>
-                      <a:pt x="92219" y="977314"/>
-                      <a:pt x="92219" y="949178"/>
-                    </a:cubicBezTo>
-                    <a:lnTo>
-                      <a:pt x="92219" y="838409"/>
-                    </a:lnTo>
-                    <a:cubicBezTo>
-                      <a:pt x="38413" y="822299"/>
-                      <a:pt x="0" y="772048"/>
-                      <a:pt x="0" y="712825"/>
-                    </a:cubicBezTo>
-                    <a:lnTo>
-                      <a:pt x="0" y="10476"/>
-                    </a:lnTo>
-                    <a:close/>
-                  </a:path>
-                </a:pathLst>
-              </a:custGeom>
-              <a:solidFill>
-                <a:srgbClr val="0070C0"/>
-              </a:solidFill>
-              <a:ln w="19050">
-                <a:solidFill>
-                  <a:schemeClr val="bg1"/>
-                </a:solidFill>
-              </a:ln>
-            </p:spPr>
-            <p:style>
-              <a:lnRef idx="2">
-                <a:schemeClr val="accent1">
-                  <a:shade val="50000"/>
-                </a:schemeClr>
-              </a:lnRef>
-              <a:fillRef idx="1">
-                <a:schemeClr val="accent1"/>
-              </a:fillRef>
-              <a:effectRef idx="0">
-                <a:schemeClr val="accent1"/>
-              </a:effectRef>
-              <a:fontRef idx="minor">
-                <a:schemeClr val="lt1"/>
-              </a:fontRef>
-            </p:style>
-            <p:txBody>
-              <a:bodyPr rtlCol="0" anchor="ctr"/>
-              <a:lstStyle/>
-              <a:p>
-                <a:pPr algn="ctr"/>
-                <a:endParaRPr lang="en-SG"/>
-              </a:p>
-            </p:txBody>
-          </p:sp>
-        </p:grpSp>
-        <p:sp>
-          <p:nvSpPr>
-            <p:cNvPr id="136" name="Rectangle 135"/>
-            <p:cNvSpPr/>
-            <p:nvPr/>
-          </p:nvSpPr>
-          <p:spPr>
-            <a:xfrm rot="10800000">
-              <a:off x="4180111" y="1375544"/>
-              <a:ext cx="549071" cy="549822"/>
-            </a:xfrm>
-            <a:prstGeom prst="rect">
-              <a:avLst/>
-            </a:prstGeom>
-            <a:noFill/>
-            <a:ln>
-              <a:noFill/>
-            </a:ln>
-          </p:spPr>
-          <p:style>
-            <a:lnRef idx="2">
-              <a:schemeClr val="accent1">
-                <a:shade val="50000"/>
-              </a:schemeClr>
-            </a:lnRef>
-            <a:fillRef idx="1">
-              <a:schemeClr val="accent1"/>
-            </a:fillRef>
-            <a:effectRef idx="0">
-              <a:schemeClr val="accent1"/>
-            </a:effectRef>
-            <a:fontRef idx="minor">
-              <a:schemeClr val="lt1"/>
-            </a:fontRef>
-          </p:style>
-          <p:txBody>
-            <a:bodyPr wrap="none" lIns="0" tIns="0" rIns="0" bIns="0" rtlCol="0" anchor="ctr"/>
-            <a:lstStyle/>
-            <a:p>
-              <a:pPr algn="ctr"/>
-              <a:endParaRPr lang="en-US" b="1"/>
-            </a:p>
-          </p:txBody>
-        </p:sp>
-      </p:grpSp>
       <p:sp>
         <p:nvSpPr>
           <p:cNvPr id="213" name="TextBox 212"/>
@@ -7470,6 +6601,1311 @@
           </a:p>
         </p:txBody>
       </p:sp>
+      <p:sp>
+        <p:nvSpPr>
+          <p:cNvPr id="104" name="Freeform: Shape 103">
+            <a:extLst>
+              <a:ext uri="{FF2B5EF4-FFF2-40B4-BE49-F238E27FC236}">
+                <a16:creationId xmlns:a16="http://schemas.microsoft.com/office/drawing/2014/main" id="{B5704358-C708-4F57-9084-A80B4B7E5AF3}"/>
+              </a:ext>
+            </a:extLst>
+          </p:cNvPr>
+          <p:cNvSpPr/>
+          <p:nvPr/>
+        </p:nvSpPr>
+        <p:spPr>
+          <a:xfrm>
+            <a:off x="2582428" y="1495841"/>
+            <a:ext cx="343904" cy="406070"/>
+          </a:xfrm>
+          <a:custGeom>
+            <a:avLst/>
+            <a:gdLst>
+              <a:gd name="connsiteX0" fmla="*/ 0 w 343904"/>
+              <a:gd name="connsiteY0" fmla="*/ 0 h 406070"/>
+              <a:gd name="connsiteX1" fmla="*/ 58393 w 343904"/>
+              <a:gd name="connsiteY1" fmla="*/ 0 h 406070"/>
+              <a:gd name="connsiteX2" fmla="*/ 58393 w 343904"/>
+              <a:gd name="connsiteY2" fmla="*/ 47861 h 406070"/>
+              <a:gd name="connsiteX3" fmla="*/ 60123 w 343904"/>
+              <a:gd name="connsiteY3" fmla="*/ 48921 h 406070"/>
+              <a:gd name="connsiteX4" fmla="*/ 290910 w 343904"/>
+              <a:gd name="connsiteY4" fmla="*/ 48921 h 406070"/>
+              <a:gd name="connsiteX5" fmla="*/ 292640 w 343904"/>
+              <a:gd name="connsiteY5" fmla="*/ 47861 h 406070"/>
+              <a:gd name="connsiteX6" fmla="*/ 292640 w 343904"/>
+              <a:gd name="connsiteY6" fmla="*/ 0 h 406070"/>
+              <a:gd name="connsiteX7" fmla="*/ 343904 w 343904"/>
+              <a:gd name="connsiteY7" fmla="*/ 0 h 406070"/>
+              <a:gd name="connsiteX8" fmla="*/ 343904 w 343904"/>
+              <a:gd name="connsiteY8" fmla="*/ 131625 h 406070"/>
+              <a:gd name="connsiteX9" fmla="*/ 324565 w 343904"/>
+              <a:gd name="connsiteY9" fmla="*/ 131625 h 406070"/>
+              <a:gd name="connsiteX10" fmla="*/ 324240 w 343904"/>
+              <a:gd name="connsiteY10" fmla="*/ 131300 h 406070"/>
+              <a:gd name="connsiteX11" fmla="*/ 169327 w 343904"/>
+              <a:gd name="connsiteY11" fmla="*/ 131300 h 406070"/>
+              <a:gd name="connsiteX12" fmla="*/ 169327 w 343904"/>
+              <a:gd name="connsiteY12" fmla="*/ 406070 h 406070"/>
+              <a:gd name="connsiteX13" fmla="*/ 0 w 343904"/>
+              <a:gd name="connsiteY13" fmla="*/ 406070 h 406070"/>
+            </a:gdLst>
+            <a:ahLst/>
+            <a:cxnLst>
+              <a:cxn ang="0">
+                <a:pos x="connsiteX0" y="connsiteY0"/>
+              </a:cxn>
+              <a:cxn ang="0">
+                <a:pos x="connsiteX1" y="connsiteY1"/>
+              </a:cxn>
+              <a:cxn ang="0">
+                <a:pos x="connsiteX2" y="connsiteY2"/>
+              </a:cxn>
+              <a:cxn ang="0">
+                <a:pos x="connsiteX3" y="connsiteY3"/>
+              </a:cxn>
+              <a:cxn ang="0">
+                <a:pos x="connsiteX4" y="connsiteY4"/>
+              </a:cxn>
+              <a:cxn ang="0">
+                <a:pos x="connsiteX5" y="connsiteY5"/>
+              </a:cxn>
+              <a:cxn ang="0">
+                <a:pos x="connsiteX6" y="connsiteY6"/>
+              </a:cxn>
+              <a:cxn ang="0">
+                <a:pos x="connsiteX7" y="connsiteY7"/>
+              </a:cxn>
+              <a:cxn ang="0">
+                <a:pos x="connsiteX8" y="connsiteY8"/>
+              </a:cxn>
+              <a:cxn ang="0">
+                <a:pos x="connsiteX9" y="connsiteY9"/>
+              </a:cxn>
+              <a:cxn ang="0">
+                <a:pos x="connsiteX10" y="connsiteY10"/>
+              </a:cxn>
+              <a:cxn ang="0">
+                <a:pos x="connsiteX11" y="connsiteY11"/>
+              </a:cxn>
+              <a:cxn ang="0">
+                <a:pos x="connsiteX12" y="connsiteY12"/>
+              </a:cxn>
+              <a:cxn ang="0">
+                <a:pos x="connsiteX13" y="connsiteY13"/>
+              </a:cxn>
+            </a:cxnLst>
+            <a:rect l="l" t="t" r="r" b="b"/>
+            <a:pathLst>
+              <a:path w="343904" h="406070">
+                <a:moveTo>
+                  <a:pt x="0" y="0"/>
+                </a:moveTo>
+                <a:lnTo>
+                  <a:pt x="58393" y="0"/>
+                </a:lnTo>
+                <a:lnTo>
+                  <a:pt x="58393" y="47861"/>
+                </a:lnTo>
+                <a:cubicBezTo>
+                  <a:pt x="58393" y="48223"/>
+                  <a:pt x="58507" y="48580"/>
+                  <a:pt x="60123" y="48921"/>
+                </a:cubicBezTo>
+                <a:lnTo>
+                  <a:pt x="290910" y="48921"/>
+                </a:lnTo>
+                <a:lnTo>
+                  <a:pt x="292640" y="47861"/>
+                </a:lnTo>
+                <a:lnTo>
+                  <a:pt x="292640" y="0"/>
+                </a:lnTo>
+                <a:lnTo>
+                  <a:pt x="343904" y="0"/>
+                </a:lnTo>
+                <a:lnTo>
+                  <a:pt x="343904" y="131625"/>
+                </a:lnTo>
+                <a:lnTo>
+                  <a:pt x="324565" y="131625"/>
+                </a:lnTo>
+                <a:lnTo>
+                  <a:pt x="324240" y="131300"/>
+                </a:lnTo>
+                <a:lnTo>
+                  <a:pt x="169327" y="131300"/>
+                </a:lnTo>
+                <a:lnTo>
+                  <a:pt x="169327" y="406070"/>
+                </a:lnTo>
+                <a:lnTo>
+                  <a:pt x="0" y="406070"/>
+                </a:lnTo>
+                <a:close/>
+              </a:path>
+            </a:pathLst>
+          </a:custGeom>
+          <a:solidFill>
+            <a:srgbClr val="F79646"/>
+          </a:solidFill>
+          <a:ln>
+            <a:noFill/>
+          </a:ln>
+        </p:spPr>
+        <p:style>
+          <a:lnRef idx="2">
+            <a:schemeClr val="accent1">
+              <a:shade val="50000"/>
+            </a:schemeClr>
+          </a:lnRef>
+          <a:fillRef idx="1">
+            <a:schemeClr val="accent1"/>
+          </a:fillRef>
+          <a:effectRef idx="0">
+            <a:schemeClr val="accent1"/>
+          </a:effectRef>
+          <a:fontRef idx="minor">
+            <a:schemeClr val="lt1"/>
+          </a:fontRef>
+        </p:style>
+        <p:txBody>
+          <a:bodyPr wrap="square" rtlCol="0" anchor="ctr">
+            <a:noAutofit/>
+          </a:bodyPr>
+          <a:lstStyle/>
+          <a:p>
+            <a:pPr algn="ctr"/>
+            <a:endParaRPr lang="en-US"/>
+          </a:p>
+        </p:txBody>
+      </p:sp>
+      <p:sp>
+        <p:nvSpPr>
+          <p:cNvPr id="96" name="Rounded Rectangle 227">
+            <a:extLst>
+              <a:ext uri="{FF2B5EF4-FFF2-40B4-BE49-F238E27FC236}">
+                <a16:creationId xmlns:a16="http://schemas.microsoft.com/office/drawing/2014/main" id="{A8E5C5D2-FD18-4149-A1B4-7006ADC53389}"/>
+              </a:ext>
+            </a:extLst>
+          </p:cNvPr>
+          <p:cNvSpPr/>
+          <p:nvPr/>
+        </p:nvSpPr>
+        <p:spPr>
+          <a:xfrm rot="10800000">
+            <a:off x="2661061" y="1442406"/>
+            <a:ext cx="193468" cy="83559"/>
+          </a:xfrm>
+          <a:custGeom>
+            <a:avLst/>
+            <a:gdLst/>
+            <a:ahLst/>
+            <a:cxnLst/>
+            <a:rect l="l" t="t" r="r" b="b"/>
+            <a:pathLst>
+              <a:path w="286327" h="1000124">
+                <a:moveTo>
+                  <a:pt x="2115" y="0"/>
+                </a:moveTo>
+                <a:lnTo>
+                  <a:pt x="284212" y="0"/>
+                </a:lnTo>
+                <a:cubicBezTo>
+                  <a:pt x="286188" y="3367"/>
+                  <a:pt x="286327" y="6905"/>
+                  <a:pt x="286327" y="10476"/>
+                </a:cubicBezTo>
+                <a:lnTo>
+                  <a:pt x="286327" y="712825"/>
+                </a:lnTo>
+                <a:cubicBezTo>
+                  <a:pt x="286327" y="772047"/>
+                  <a:pt x="247915" y="822299"/>
+                  <a:pt x="194109" y="838409"/>
+                </a:cubicBezTo>
+                <a:cubicBezTo>
+                  <a:pt x="194108" y="875332"/>
+                  <a:pt x="194108" y="912256"/>
+                  <a:pt x="194108" y="949179"/>
+                </a:cubicBezTo>
+                <a:cubicBezTo>
+                  <a:pt x="194108" y="977315"/>
+                  <a:pt x="171299" y="1000124"/>
+                  <a:pt x="143163" y="1000124"/>
+                </a:cubicBezTo>
+                <a:lnTo>
+                  <a:pt x="143164" y="1000123"/>
+                </a:lnTo>
+                <a:cubicBezTo>
+                  <a:pt x="115028" y="1000123"/>
+                  <a:pt x="92219" y="977314"/>
+                  <a:pt x="92219" y="949178"/>
+                </a:cubicBezTo>
+                <a:lnTo>
+                  <a:pt x="92219" y="838409"/>
+                </a:lnTo>
+                <a:cubicBezTo>
+                  <a:pt x="38413" y="822299"/>
+                  <a:pt x="0" y="772048"/>
+                  <a:pt x="0" y="712825"/>
+                </a:cubicBezTo>
+                <a:lnTo>
+                  <a:pt x="0" y="10476"/>
+                </a:lnTo>
+                <a:close/>
+              </a:path>
+            </a:pathLst>
+          </a:custGeom>
+          <a:solidFill>
+            <a:srgbClr val="F79646"/>
+          </a:solidFill>
+          <a:ln w="19050">
+            <a:noFill/>
+          </a:ln>
+        </p:spPr>
+        <p:style>
+          <a:lnRef idx="2">
+            <a:schemeClr val="accent1">
+              <a:shade val="50000"/>
+            </a:schemeClr>
+          </a:lnRef>
+          <a:fillRef idx="1">
+            <a:schemeClr val="accent1"/>
+          </a:fillRef>
+          <a:effectRef idx="0">
+            <a:schemeClr val="accent1"/>
+          </a:effectRef>
+          <a:fontRef idx="minor">
+            <a:schemeClr val="lt1"/>
+          </a:fontRef>
+        </p:style>
+        <p:txBody>
+          <a:bodyPr rtlCol="0" anchor="ctr"/>
+          <a:lstStyle/>
+          <a:p>
+            <a:pPr algn="ctr"/>
+            <a:endParaRPr lang="en-SG"/>
+          </a:p>
+        </p:txBody>
+      </p:sp>
+      <p:sp>
+        <p:nvSpPr>
+          <p:cNvPr id="148" name="Freeform: Shape 147">
+            <a:extLst>
+              <a:ext uri="{FF2B5EF4-FFF2-40B4-BE49-F238E27FC236}">
+                <a16:creationId xmlns:a16="http://schemas.microsoft.com/office/drawing/2014/main" id="{DD892782-A0CE-4B33-89B0-93E71BFC2F2C}"/>
+              </a:ext>
+            </a:extLst>
+          </p:cNvPr>
+          <p:cNvSpPr/>
+          <p:nvPr/>
+        </p:nvSpPr>
+        <p:spPr>
+          <a:xfrm rot="10800000" flipH="1">
+            <a:off x="2773976" y="1645863"/>
+            <a:ext cx="263060" cy="320997"/>
+          </a:xfrm>
+          <a:custGeom>
+            <a:avLst/>
+            <a:gdLst>
+              <a:gd name="connsiteX0" fmla="*/ 0 w 263060"/>
+              <a:gd name="connsiteY0" fmla="*/ 320997 h 320997"/>
+              <a:gd name="connsiteX1" fmla="*/ 143192 w 263060"/>
+              <a:gd name="connsiteY1" fmla="*/ 320997 h 320997"/>
+              <a:gd name="connsiteX2" fmla="*/ 166675 w 263060"/>
+              <a:gd name="connsiteY2" fmla="*/ 224469 h 320997"/>
+              <a:gd name="connsiteX3" fmla="*/ 167872 w 263060"/>
+              <a:gd name="connsiteY3" fmla="*/ 224760 h 320997"/>
+              <a:gd name="connsiteX4" fmla="*/ 167552 w 263060"/>
+              <a:gd name="connsiteY4" fmla="*/ 223402 h 320997"/>
+              <a:gd name="connsiteX5" fmla="*/ 263060 w 263060"/>
+              <a:gd name="connsiteY5" fmla="*/ 200938 h 320997"/>
+              <a:gd name="connsiteX6" fmla="*/ 263060 w 263060"/>
+              <a:gd name="connsiteY6" fmla="*/ 0 h 320997"/>
+              <a:gd name="connsiteX7" fmla="*/ 0 w 263060"/>
+              <a:gd name="connsiteY7" fmla="*/ 0 h 320997"/>
+            </a:gdLst>
+            <a:ahLst/>
+            <a:cxnLst>
+              <a:cxn ang="0">
+                <a:pos x="connsiteX0" y="connsiteY0"/>
+              </a:cxn>
+              <a:cxn ang="0">
+                <a:pos x="connsiteX1" y="connsiteY1"/>
+              </a:cxn>
+              <a:cxn ang="0">
+                <a:pos x="connsiteX2" y="connsiteY2"/>
+              </a:cxn>
+              <a:cxn ang="0">
+                <a:pos x="connsiteX3" y="connsiteY3"/>
+              </a:cxn>
+              <a:cxn ang="0">
+                <a:pos x="connsiteX4" y="connsiteY4"/>
+              </a:cxn>
+              <a:cxn ang="0">
+                <a:pos x="connsiteX5" y="connsiteY5"/>
+              </a:cxn>
+              <a:cxn ang="0">
+                <a:pos x="connsiteX6" y="connsiteY6"/>
+              </a:cxn>
+              <a:cxn ang="0">
+                <a:pos x="connsiteX7" y="connsiteY7"/>
+              </a:cxn>
+            </a:cxnLst>
+            <a:rect l="l" t="t" r="r" b="b"/>
+            <a:pathLst>
+              <a:path w="263060" h="320997">
+                <a:moveTo>
+                  <a:pt x="0" y="320997"/>
+                </a:moveTo>
+                <a:lnTo>
+                  <a:pt x="143192" y="320997"/>
+                </a:lnTo>
+                <a:lnTo>
+                  <a:pt x="166675" y="224469"/>
+                </a:lnTo>
+                <a:lnTo>
+                  <a:pt x="167872" y="224760"/>
+                </a:lnTo>
+                <a:lnTo>
+                  <a:pt x="167552" y="223402"/>
+                </a:lnTo>
+                <a:lnTo>
+                  <a:pt x="263060" y="200938"/>
+                </a:lnTo>
+                <a:lnTo>
+                  <a:pt x="263060" y="0"/>
+                </a:lnTo>
+                <a:lnTo>
+                  <a:pt x="0" y="0"/>
+                </a:lnTo>
+                <a:close/>
+              </a:path>
+            </a:pathLst>
+          </a:custGeom>
+          <a:solidFill>
+            <a:srgbClr val="0070C0"/>
+          </a:solidFill>
+          <a:ln>
+            <a:noFill/>
+          </a:ln>
+        </p:spPr>
+        <p:style>
+          <a:lnRef idx="2">
+            <a:schemeClr val="accent1"/>
+          </a:lnRef>
+          <a:fillRef idx="1">
+            <a:schemeClr val="lt1"/>
+          </a:fillRef>
+          <a:effectRef idx="0">
+            <a:schemeClr val="accent1"/>
+          </a:effectRef>
+          <a:fontRef idx="minor">
+            <a:schemeClr val="dk1"/>
+          </a:fontRef>
+        </p:style>
+        <p:txBody>
+          <a:bodyPr wrap="square" rtlCol="0" anchor="ctr">
+            <a:noAutofit/>
+          </a:bodyPr>
+          <a:lstStyle/>
+          <a:p>
+            <a:pPr algn="ctr"/>
+            <a:endParaRPr lang="en-US" dirty="0"/>
+          </a:p>
+        </p:txBody>
+      </p:sp>
+      <p:sp>
+        <p:nvSpPr>
+          <p:cNvPr id="153" name="Freeform: Shape 152">
+            <a:extLst>
+              <a:ext uri="{FF2B5EF4-FFF2-40B4-BE49-F238E27FC236}">
+                <a16:creationId xmlns:a16="http://schemas.microsoft.com/office/drawing/2014/main" id="{05BD2F97-CF86-4565-A19A-DA5A42F2C7BD}"/>
+              </a:ext>
+            </a:extLst>
+          </p:cNvPr>
+          <p:cNvSpPr/>
+          <p:nvPr/>
+        </p:nvSpPr>
+        <p:spPr>
+          <a:xfrm rot="794163">
+            <a:off x="2926296" y="1657162"/>
+            <a:ext cx="123332" cy="75934"/>
+          </a:xfrm>
+          <a:custGeom>
+            <a:avLst/>
+            <a:gdLst>
+              <a:gd name="connsiteX0" fmla="*/ 0 w 144316"/>
+              <a:gd name="connsiteY0" fmla="*/ 0 h 88854"/>
+              <a:gd name="connsiteX1" fmla="*/ 144288 w 144316"/>
+              <a:gd name="connsiteY1" fmla="*/ 88733 h 88854"/>
+              <a:gd name="connsiteX2" fmla="*/ 144316 w 144316"/>
+              <a:gd name="connsiteY2" fmla="*/ 88854 h 88854"/>
+              <a:gd name="connsiteX3" fmla="*/ 45769 w 144316"/>
+              <a:gd name="connsiteY3" fmla="*/ 88854 h 88854"/>
+              <a:gd name="connsiteX4" fmla="*/ 45769 w 144316"/>
+              <a:gd name="connsiteY4" fmla="*/ 87459 h 88854"/>
+              <a:gd name="connsiteX5" fmla="*/ 44671 w 144316"/>
+              <a:gd name="connsiteY5" fmla="*/ 88016 h 88854"/>
+            </a:gdLst>
+            <a:ahLst/>
+            <a:cxnLst>
+              <a:cxn ang="0">
+                <a:pos x="connsiteX0" y="connsiteY0"/>
+              </a:cxn>
+              <a:cxn ang="0">
+                <a:pos x="connsiteX1" y="connsiteY1"/>
+              </a:cxn>
+              <a:cxn ang="0">
+                <a:pos x="connsiteX2" y="connsiteY2"/>
+              </a:cxn>
+              <a:cxn ang="0">
+                <a:pos x="connsiteX3" y="connsiteY3"/>
+              </a:cxn>
+              <a:cxn ang="0">
+                <a:pos x="connsiteX4" y="connsiteY4"/>
+              </a:cxn>
+              <a:cxn ang="0">
+                <a:pos x="connsiteX5" y="connsiteY5"/>
+              </a:cxn>
+            </a:cxnLst>
+            <a:rect l="l" t="t" r="r" b="b"/>
+            <a:pathLst>
+              <a:path w="144316" h="88854">
+                <a:moveTo>
+                  <a:pt x="0" y="0"/>
+                </a:moveTo>
+                <a:lnTo>
+                  <a:pt x="144288" y="88733"/>
+                </a:lnTo>
+                <a:lnTo>
+                  <a:pt x="144316" y="88854"/>
+                </a:lnTo>
+                <a:lnTo>
+                  <a:pt x="45769" y="88854"/>
+                </a:lnTo>
+                <a:lnTo>
+                  <a:pt x="45769" y="87459"/>
+                </a:lnTo>
+                <a:lnTo>
+                  <a:pt x="44671" y="88016"/>
+                </a:lnTo>
+                <a:close/>
+              </a:path>
+            </a:pathLst>
+          </a:custGeom>
+          <a:solidFill>
+            <a:srgbClr val="0070C0"/>
+          </a:solidFill>
+          <a:ln>
+            <a:noFill/>
+          </a:ln>
+        </p:spPr>
+        <p:style>
+          <a:lnRef idx="2">
+            <a:schemeClr val="accent1">
+              <a:shade val="50000"/>
+            </a:schemeClr>
+          </a:lnRef>
+          <a:fillRef idx="1">
+            <a:schemeClr val="accent1"/>
+          </a:fillRef>
+          <a:effectRef idx="0">
+            <a:schemeClr val="accent1"/>
+          </a:effectRef>
+          <a:fontRef idx="minor">
+            <a:schemeClr val="lt1"/>
+          </a:fontRef>
+        </p:style>
+        <p:txBody>
+          <a:bodyPr rtlCol="0" anchor="ctr"/>
+          <a:lstStyle/>
+          <a:p>
+            <a:pPr algn="ctr"/>
+            <a:endParaRPr lang="en-US"/>
+          </a:p>
+        </p:txBody>
+      </p:sp>
+      <p:grpSp>
+        <p:nvGrpSpPr>
+          <p:cNvPr id="14" name="Group 13">
+            <a:extLst>
+              <a:ext uri="{FF2B5EF4-FFF2-40B4-BE49-F238E27FC236}">
+                <a16:creationId xmlns:a16="http://schemas.microsoft.com/office/drawing/2014/main" id="{D893555B-2CCD-4C7F-92F0-96D7570DF7E4}"/>
+              </a:ext>
+            </a:extLst>
+          </p:cNvPr>
+          <p:cNvGrpSpPr/>
+          <p:nvPr/>
+        </p:nvGrpSpPr>
+        <p:grpSpPr>
+          <a:xfrm>
+            <a:off x="931555" y="1414827"/>
+            <a:ext cx="838200" cy="838200"/>
+            <a:chOff x="931555" y="1414827"/>
+            <a:chExt cx="838200" cy="838200"/>
+          </a:xfrm>
+        </p:grpSpPr>
+        <p:grpSp>
+          <p:nvGrpSpPr>
+            <p:cNvPr id="2" name="Group 1"/>
+            <p:cNvGrpSpPr/>
+            <p:nvPr/>
+          </p:nvGrpSpPr>
+          <p:grpSpPr>
+            <a:xfrm>
+              <a:off x="931555" y="1414827"/>
+              <a:ext cx="838200" cy="838200"/>
+              <a:chOff x="931555" y="1414827"/>
+              <a:chExt cx="838200" cy="838200"/>
+            </a:xfrm>
+          </p:grpSpPr>
+          <p:grpSp>
+            <p:nvGrpSpPr>
+              <p:cNvPr id="150" name="Group 149"/>
+              <p:cNvGrpSpPr/>
+              <p:nvPr/>
+            </p:nvGrpSpPr>
+            <p:grpSpPr>
+              <a:xfrm>
+                <a:off x="931555" y="1414827"/>
+                <a:ext cx="838200" cy="838200"/>
+                <a:chOff x="1002575" y="1231726"/>
+                <a:chExt cx="838200" cy="838200"/>
+              </a:xfrm>
+            </p:grpSpPr>
+            <p:sp>
+              <p:nvSpPr>
+                <p:cNvPr id="151" name="Rectangle 150"/>
+                <p:cNvSpPr/>
+                <p:nvPr/>
+              </p:nvSpPr>
+              <p:spPr>
+                <a:xfrm>
+                  <a:off x="1002575" y="1231726"/>
+                  <a:ext cx="838200" cy="838200"/>
+                </a:xfrm>
+                <a:prstGeom prst="rect">
+                  <a:avLst/>
+                </a:prstGeom>
+                <a:noFill/>
+                <a:ln>
+                  <a:noFill/>
+                </a:ln>
+              </p:spPr>
+              <p:style>
+                <a:lnRef idx="2">
+                  <a:schemeClr val="accent1">
+                    <a:shade val="50000"/>
+                  </a:schemeClr>
+                </a:lnRef>
+                <a:fillRef idx="1">
+                  <a:schemeClr val="accent1"/>
+                </a:fillRef>
+                <a:effectRef idx="0">
+                  <a:schemeClr val="accent1"/>
+                </a:effectRef>
+                <a:fontRef idx="minor">
+                  <a:schemeClr val="lt1"/>
+                </a:fontRef>
+              </p:style>
+              <p:txBody>
+                <a:bodyPr rtlCol="0" anchor="ctr"/>
+                <a:lstStyle/>
+                <a:p>
+                  <a:pPr algn="ctr"/>
+                  <a:endParaRPr lang="en-SG"/>
+                </a:p>
+              </p:txBody>
+            </p:sp>
+            <p:sp>
+              <p:nvSpPr>
+                <p:cNvPr id="152" name="Rectangle 4"/>
+                <p:cNvSpPr/>
+                <p:nvPr/>
+              </p:nvSpPr>
+              <p:spPr>
+                <a:xfrm rot="16200000">
+                  <a:off x="1071530" y="1304929"/>
+                  <a:ext cx="700291" cy="690781"/>
+                </a:xfrm>
+                <a:custGeom>
+                  <a:avLst/>
+                  <a:gdLst/>
+                  <a:ahLst/>
+                  <a:cxnLst/>
+                  <a:rect l="l" t="t" r="r" b="b"/>
+                  <a:pathLst>
+                    <a:path w="1752603" h="1752600">
+                      <a:moveTo>
+                        <a:pt x="533400" y="0"/>
+                      </a:moveTo>
+                      <a:lnTo>
+                        <a:pt x="533403" y="0"/>
+                      </a:lnTo>
+                      <a:lnTo>
+                        <a:pt x="1066800" y="0"/>
+                      </a:lnTo>
+                      <a:lnTo>
+                        <a:pt x="1752603" y="0"/>
+                      </a:lnTo>
+                      <a:lnTo>
+                        <a:pt x="1752603" y="1752600"/>
+                      </a:lnTo>
+                      <a:lnTo>
+                        <a:pt x="1219203" y="1752600"/>
+                      </a:lnTo>
+                      <a:lnTo>
+                        <a:pt x="533403" y="1752600"/>
+                      </a:lnTo>
+                      <a:lnTo>
+                        <a:pt x="3" y="1752600"/>
+                      </a:lnTo>
+                      <a:lnTo>
+                        <a:pt x="3" y="533430"/>
+                      </a:lnTo>
+                      <a:cubicBezTo>
+                        <a:pt x="0" y="533420"/>
+                        <a:pt x="0" y="533410"/>
+                        <a:pt x="0" y="533400"/>
+                      </a:cubicBezTo>
+                      <a:cubicBezTo>
+                        <a:pt x="0" y="238811"/>
+                        <a:pt x="238811" y="0"/>
+                        <a:pt x="533400" y="0"/>
+                      </a:cubicBezTo>
+                      <a:close/>
+                    </a:path>
+                  </a:pathLst>
+                </a:custGeom>
+                <a:noFill/>
+                <a:ln w="76200" cmpd="sng">
+                  <a:solidFill>
+                    <a:srgbClr val="0070C0"/>
+                  </a:solidFill>
+                  <a:miter lim="800000"/>
+                </a:ln>
+              </p:spPr>
+              <p:style>
+                <a:lnRef idx="2">
+                  <a:schemeClr val="accent1">
+                    <a:shade val="50000"/>
+                  </a:schemeClr>
+                </a:lnRef>
+                <a:fillRef idx="1">
+                  <a:schemeClr val="accent1"/>
+                </a:fillRef>
+                <a:effectRef idx="0">
+                  <a:schemeClr val="accent1"/>
+                </a:effectRef>
+                <a:fontRef idx="minor">
+                  <a:schemeClr val="lt1"/>
+                </a:fontRef>
+              </p:style>
+              <p:txBody>
+                <a:bodyPr rtlCol="0" anchor="ctr"/>
+                <a:lstStyle/>
+                <a:p>
+                  <a:pPr algn="ctr"/>
+                  <a:endParaRPr lang="en-US"/>
+                </a:p>
+              </p:txBody>
+            </p:sp>
+          </p:grpSp>
+          <p:sp>
+            <p:nvSpPr>
+              <p:cNvPr id="120" name="Rectangle 119"/>
+              <p:cNvSpPr/>
+              <p:nvPr/>
+            </p:nvSpPr>
+            <p:spPr>
+              <a:xfrm rot="10800000">
+                <a:off x="1076119" y="1552453"/>
+                <a:ext cx="549071" cy="549822"/>
+              </a:xfrm>
+              <a:prstGeom prst="rect">
+                <a:avLst/>
+              </a:prstGeom>
+              <a:noFill/>
+              <a:ln>
+                <a:noFill/>
+              </a:ln>
+            </p:spPr>
+            <p:style>
+              <a:lnRef idx="2">
+                <a:schemeClr val="accent1">
+                  <a:shade val="50000"/>
+                </a:schemeClr>
+              </a:lnRef>
+              <a:fillRef idx="1">
+                <a:schemeClr val="accent1"/>
+              </a:fillRef>
+              <a:effectRef idx="0">
+                <a:schemeClr val="accent1"/>
+              </a:effectRef>
+              <a:fontRef idx="minor">
+                <a:schemeClr val="lt1"/>
+              </a:fontRef>
+            </p:style>
+            <p:txBody>
+              <a:bodyPr wrap="none" lIns="0" tIns="0" rIns="0" bIns="0" rtlCol="0" anchor="ctr"/>
+              <a:lstStyle/>
+              <a:p>
+                <a:pPr algn="ctr"/>
+                <a:endParaRPr lang="en-US" b="1"/>
+              </a:p>
+            </p:txBody>
+          </p:sp>
+        </p:grpSp>
+        <p:grpSp>
+          <p:nvGrpSpPr>
+            <p:cNvPr id="13" name="Group 12">
+              <a:extLst>
+                <a:ext uri="{FF2B5EF4-FFF2-40B4-BE49-F238E27FC236}">
+                  <a16:creationId xmlns:a16="http://schemas.microsoft.com/office/drawing/2014/main" id="{B33874E5-7577-4917-9556-338BBB8CCA3B}"/>
+                </a:ext>
+              </a:extLst>
+            </p:cNvPr>
+            <p:cNvGrpSpPr/>
+            <p:nvPr/>
+          </p:nvGrpSpPr>
+          <p:grpSpPr>
+            <a:xfrm>
+              <a:off x="1132095" y="1558049"/>
+              <a:ext cx="467200" cy="524454"/>
+              <a:chOff x="2734828" y="1594806"/>
+              <a:chExt cx="467200" cy="524454"/>
+            </a:xfrm>
+          </p:grpSpPr>
+          <p:sp>
+            <p:nvSpPr>
+              <p:cNvPr id="154" name="Freeform: Shape 153">
+                <a:extLst>
+                  <a:ext uri="{FF2B5EF4-FFF2-40B4-BE49-F238E27FC236}">
+                    <a16:creationId xmlns:a16="http://schemas.microsoft.com/office/drawing/2014/main" id="{22D8410C-7850-4C5D-BF56-3D68074E77F9}"/>
+                  </a:ext>
+                </a:extLst>
+              </p:cNvPr>
+              <p:cNvSpPr/>
+              <p:nvPr/>
+            </p:nvSpPr>
+            <p:spPr>
+              <a:xfrm>
+                <a:off x="2734828" y="1648241"/>
+                <a:ext cx="343904" cy="406070"/>
+              </a:xfrm>
+              <a:custGeom>
+                <a:avLst/>
+                <a:gdLst>
+                  <a:gd name="connsiteX0" fmla="*/ 0 w 343904"/>
+                  <a:gd name="connsiteY0" fmla="*/ 0 h 406070"/>
+                  <a:gd name="connsiteX1" fmla="*/ 58393 w 343904"/>
+                  <a:gd name="connsiteY1" fmla="*/ 0 h 406070"/>
+                  <a:gd name="connsiteX2" fmla="*/ 58393 w 343904"/>
+                  <a:gd name="connsiteY2" fmla="*/ 47861 h 406070"/>
+                  <a:gd name="connsiteX3" fmla="*/ 60123 w 343904"/>
+                  <a:gd name="connsiteY3" fmla="*/ 48921 h 406070"/>
+                  <a:gd name="connsiteX4" fmla="*/ 290910 w 343904"/>
+                  <a:gd name="connsiteY4" fmla="*/ 48921 h 406070"/>
+                  <a:gd name="connsiteX5" fmla="*/ 292640 w 343904"/>
+                  <a:gd name="connsiteY5" fmla="*/ 47861 h 406070"/>
+                  <a:gd name="connsiteX6" fmla="*/ 292640 w 343904"/>
+                  <a:gd name="connsiteY6" fmla="*/ 0 h 406070"/>
+                  <a:gd name="connsiteX7" fmla="*/ 343904 w 343904"/>
+                  <a:gd name="connsiteY7" fmla="*/ 0 h 406070"/>
+                  <a:gd name="connsiteX8" fmla="*/ 343904 w 343904"/>
+                  <a:gd name="connsiteY8" fmla="*/ 131625 h 406070"/>
+                  <a:gd name="connsiteX9" fmla="*/ 324565 w 343904"/>
+                  <a:gd name="connsiteY9" fmla="*/ 131625 h 406070"/>
+                  <a:gd name="connsiteX10" fmla="*/ 324240 w 343904"/>
+                  <a:gd name="connsiteY10" fmla="*/ 131300 h 406070"/>
+                  <a:gd name="connsiteX11" fmla="*/ 169327 w 343904"/>
+                  <a:gd name="connsiteY11" fmla="*/ 131300 h 406070"/>
+                  <a:gd name="connsiteX12" fmla="*/ 169327 w 343904"/>
+                  <a:gd name="connsiteY12" fmla="*/ 406070 h 406070"/>
+                  <a:gd name="connsiteX13" fmla="*/ 0 w 343904"/>
+                  <a:gd name="connsiteY13" fmla="*/ 406070 h 406070"/>
+                </a:gdLst>
+                <a:ahLst/>
+                <a:cxnLst>
+                  <a:cxn ang="0">
+                    <a:pos x="connsiteX0" y="connsiteY0"/>
+                  </a:cxn>
+                  <a:cxn ang="0">
+                    <a:pos x="connsiteX1" y="connsiteY1"/>
+                  </a:cxn>
+                  <a:cxn ang="0">
+                    <a:pos x="connsiteX2" y="connsiteY2"/>
+                  </a:cxn>
+                  <a:cxn ang="0">
+                    <a:pos x="connsiteX3" y="connsiteY3"/>
+                  </a:cxn>
+                  <a:cxn ang="0">
+                    <a:pos x="connsiteX4" y="connsiteY4"/>
+                  </a:cxn>
+                  <a:cxn ang="0">
+                    <a:pos x="connsiteX5" y="connsiteY5"/>
+                  </a:cxn>
+                  <a:cxn ang="0">
+                    <a:pos x="connsiteX6" y="connsiteY6"/>
+                  </a:cxn>
+                  <a:cxn ang="0">
+                    <a:pos x="connsiteX7" y="connsiteY7"/>
+                  </a:cxn>
+                  <a:cxn ang="0">
+                    <a:pos x="connsiteX8" y="connsiteY8"/>
+                  </a:cxn>
+                  <a:cxn ang="0">
+                    <a:pos x="connsiteX9" y="connsiteY9"/>
+                  </a:cxn>
+                  <a:cxn ang="0">
+                    <a:pos x="connsiteX10" y="connsiteY10"/>
+                  </a:cxn>
+                  <a:cxn ang="0">
+                    <a:pos x="connsiteX11" y="connsiteY11"/>
+                  </a:cxn>
+                  <a:cxn ang="0">
+                    <a:pos x="connsiteX12" y="connsiteY12"/>
+                  </a:cxn>
+                  <a:cxn ang="0">
+                    <a:pos x="connsiteX13" y="connsiteY13"/>
+                  </a:cxn>
+                </a:cxnLst>
+                <a:rect l="l" t="t" r="r" b="b"/>
+                <a:pathLst>
+                  <a:path w="343904" h="406070">
+                    <a:moveTo>
+                      <a:pt x="0" y="0"/>
+                    </a:moveTo>
+                    <a:lnTo>
+                      <a:pt x="58393" y="0"/>
+                    </a:lnTo>
+                    <a:lnTo>
+                      <a:pt x="58393" y="47861"/>
+                    </a:lnTo>
+                    <a:cubicBezTo>
+                      <a:pt x="58393" y="48223"/>
+                      <a:pt x="58507" y="48580"/>
+                      <a:pt x="60123" y="48921"/>
+                    </a:cubicBezTo>
+                    <a:lnTo>
+                      <a:pt x="290910" y="48921"/>
+                    </a:lnTo>
+                    <a:lnTo>
+                      <a:pt x="292640" y="47861"/>
+                    </a:lnTo>
+                    <a:lnTo>
+                      <a:pt x="292640" y="0"/>
+                    </a:lnTo>
+                    <a:lnTo>
+                      <a:pt x="343904" y="0"/>
+                    </a:lnTo>
+                    <a:lnTo>
+                      <a:pt x="343904" y="131625"/>
+                    </a:lnTo>
+                    <a:lnTo>
+                      <a:pt x="324565" y="131625"/>
+                    </a:lnTo>
+                    <a:lnTo>
+                      <a:pt x="324240" y="131300"/>
+                    </a:lnTo>
+                    <a:lnTo>
+                      <a:pt x="169327" y="131300"/>
+                    </a:lnTo>
+                    <a:lnTo>
+                      <a:pt x="169327" y="406070"/>
+                    </a:lnTo>
+                    <a:lnTo>
+                      <a:pt x="0" y="406070"/>
+                    </a:lnTo>
+                    <a:close/>
+                  </a:path>
+                </a:pathLst>
+              </a:custGeom>
+              <a:solidFill>
+                <a:srgbClr val="F79646"/>
+              </a:solidFill>
+              <a:ln>
+                <a:noFill/>
+              </a:ln>
+            </p:spPr>
+            <p:style>
+              <a:lnRef idx="2">
+                <a:schemeClr val="accent1">
+                  <a:shade val="50000"/>
+                </a:schemeClr>
+              </a:lnRef>
+              <a:fillRef idx="1">
+                <a:schemeClr val="accent1"/>
+              </a:fillRef>
+              <a:effectRef idx="0">
+                <a:schemeClr val="accent1"/>
+              </a:effectRef>
+              <a:fontRef idx="minor">
+                <a:schemeClr val="lt1"/>
+              </a:fontRef>
+            </p:style>
+            <p:txBody>
+              <a:bodyPr wrap="square" rtlCol="0" anchor="ctr">
+                <a:noAutofit/>
+              </a:bodyPr>
+              <a:lstStyle/>
+              <a:p>
+                <a:pPr algn="ctr"/>
+                <a:endParaRPr lang="en-US"/>
+              </a:p>
+            </p:txBody>
+          </p:sp>
+          <p:sp>
+            <p:nvSpPr>
+              <p:cNvPr id="155" name="Rounded Rectangle 227">
+                <a:extLst>
+                  <a:ext uri="{FF2B5EF4-FFF2-40B4-BE49-F238E27FC236}">
+                    <a16:creationId xmlns:a16="http://schemas.microsoft.com/office/drawing/2014/main" id="{F53D5A38-394D-4127-8CBC-601AB5541622}"/>
+                  </a:ext>
+                </a:extLst>
+              </p:cNvPr>
+              <p:cNvSpPr/>
+              <p:nvPr/>
+            </p:nvSpPr>
+            <p:spPr>
+              <a:xfrm rot="10800000">
+                <a:off x="2813461" y="1594806"/>
+                <a:ext cx="193468" cy="83559"/>
+              </a:xfrm>
+              <a:custGeom>
+                <a:avLst/>
+                <a:gdLst/>
+                <a:ahLst/>
+                <a:cxnLst/>
+                <a:rect l="l" t="t" r="r" b="b"/>
+                <a:pathLst>
+                  <a:path w="286327" h="1000124">
+                    <a:moveTo>
+                      <a:pt x="2115" y="0"/>
+                    </a:moveTo>
+                    <a:lnTo>
+                      <a:pt x="284212" y="0"/>
+                    </a:lnTo>
+                    <a:cubicBezTo>
+                      <a:pt x="286188" y="3367"/>
+                      <a:pt x="286327" y="6905"/>
+                      <a:pt x="286327" y="10476"/>
+                    </a:cubicBezTo>
+                    <a:lnTo>
+                      <a:pt x="286327" y="712825"/>
+                    </a:lnTo>
+                    <a:cubicBezTo>
+                      <a:pt x="286327" y="772047"/>
+                      <a:pt x="247915" y="822299"/>
+                      <a:pt x="194109" y="838409"/>
+                    </a:cubicBezTo>
+                    <a:cubicBezTo>
+                      <a:pt x="194108" y="875332"/>
+                      <a:pt x="194108" y="912256"/>
+                      <a:pt x="194108" y="949179"/>
+                    </a:cubicBezTo>
+                    <a:cubicBezTo>
+                      <a:pt x="194108" y="977315"/>
+                      <a:pt x="171299" y="1000124"/>
+                      <a:pt x="143163" y="1000124"/>
+                    </a:cubicBezTo>
+                    <a:lnTo>
+                      <a:pt x="143164" y="1000123"/>
+                    </a:lnTo>
+                    <a:cubicBezTo>
+                      <a:pt x="115028" y="1000123"/>
+                      <a:pt x="92219" y="977314"/>
+                      <a:pt x="92219" y="949178"/>
+                    </a:cubicBezTo>
+                    <a:lnTo>
+                      <a:pt x="92219" y="838409"/>
+                    </a:lnTo>
+                    <a:cubicBezTo>
+                      <a:pt x="38413" y="822299"/>
+                      <a:pt x="0" y="772048"/>
+                      <a:pt x="0" y="712825"/>
+                    </a:cubicBezTo>
+                    <a:lnTo>
+                      <a:pt x="0" y="10476"/>
+                    </a:lnTo>
+                    <a:close/>
+                  </a:path>
+                </a:pathLst>
+              </a:custGeom>
+              <a:solidFill>
+                <a:srgbClr val="F79646"/>
+              </a:solidFill>
+              <a:ln w="19050">
+                <a:noFill/>
+              </a:ln>
+            </p:spPr>
+            <p:style>
+              <a:lnRef idx="2">
+                <a:schemeClr val="accent1">
+                  <a:shade val="50000"/>
+                </a:schemeClr>
+              </a:lnRef>
+              <a:fillRef idx="1">
+                <a:schemeClr val="accent1"/>
+              </a:fillRef>
+              <a:effectRef idx="0">
+                <a:schemeClr val="accent1"/>
+              </a:effectRef>
+              <a:fontRef idx="minor">
+                <a:schemeClr val="lt1"/>
+              </a:fontRef>
+            </p:style>
+            <p:txBody>
+              <a:bodyPr rtlCol="0" anchor="ctr"/>
+              <a:lstStyle/>
+              <a:p>
+                <a:pPr algn="ctr"/>
+                <a:endParaRPr lang="en-SG"/>
+              </a:p>
+            </p:txBody>
+          </p:sp>
+          <p:sp>
+            <p:nvSpPr>
+              <p:cNvPr id="156" name="Freeform: Shape 155">
+                <a:extLst>
+                  <a:ext uri="{FF2B5EF4-FFF2-40B4-BE49-F238E27FC236}">
+                    <a16:creationId xmlns:a16="http://schemas.microsoft.com/office/drawing/2014/main" id="{1FDECEA1-4E8C-4CBA-AD15-6ECE6B4865AE}"/>
+                  </a:ext>
+                </a:extLst>
+              </p:cNvPr>
+              <p:cNvSpPr/>
+              <p:nvPr/>
+            </p:nvSpPr>
+            <p:spPr>
+              <a:xfrm rot="10800000" flipH="1">
+                <a:off x="2926376" y="1798263"/>
+                <a:ext cx="263060" cy="320997"/>
+              </a:xfrm>
+              <a:custGeom>
+                <a:avLst/>
+                <a:gdLst>
+                  <a:gd name="connsiteX0" fmla="*/ 0 w 263060"/>
+                  <a:gd name="connsiteY0" fmla="*/ 320997 h 320997"/>
+                  <a:gd name="connsiteX1" fmla="*/ 143192 w 263060"/>
+                  <a:gd name="connsiteY1" fmla="*/ 320997 h 320997"/>
+                  <a:gd name="connsiteX2" fmla="*/ 166675 w 263060"/>
+                  <a:gd name="connsiteY2" fmla="*/ 224469 h 320997"/>
+                  <a:gd name="connsiteX3" fmla="*/ 167872 w 263060"/>
+                  <a:gd name="connsiteY3" fmla="*/ 224760 h 320997"/>
+                  <a:gd name="connsiteX4" fmla="*/ 167552 w 263060"/>
+                  <a:gd name="connsiteY4" fmla="*/ 223402 h 320997"/>
+                  <a:gd name="connsiteX5" fmla="*/ 263060 w 263060"/>
+                  <a:gd name="connsiteY5" fmla="*/ 200938 h 320997"/>
+                  <a:gd name="connsiteX6" fmla="*/ 263060 w 263060"/>
+                  <a:gd name="connsiteY6" fmla="*/ 0 h 320997"/>
+                  <a:gd name="connsiteX7" fmla="*/ 0 w 263060"/>
+                  <a:gd name="connsiteY7" fmla="*/ 0 h 320997"/>
+                </a:gdLst>
+                <a:ahLst/>
+                <a:cxnLst>
+                  <a:cxn ang="0">
+                    <a:pos x="connsiteX0" y="connsiteY0"/>
+                  </a:cxn>
+                  <a:cxn ang="0">
+                    <a:pos x="connsiteX1" y="connsiteY1"/>
+                  </a:cxn>
+                  <a:cxn ang="0">
+                    <a:pos x="connsiteX2" y="connsiteY2"/>
+                  </a:cxn>
+                  <a:cxn ang="0">
+                    <a:pos x="connsiteX3" y="connsiteY3"/>
+                  </a:cxn>
+                  <a:cxn ang="0">
+                    <a:pos x="connsiteX4" y="connsiteY4"/>
+                  </a:cxn>
+                  <a:cxn ang="0">
+                    <a:pos x="connsiteX5" y="connsiteY5"/>
+                  </a:cxn>
+                  <a:cxn ang="0">
+                    <a:pos x="connsiteX6" y="connsiteY6"/>
+                  </a:cxn>
+                  <a:cxn ang="0">
+                    <a:pos x="connsiteX7" y="connsiteY7"/>
+                  </a:cxn>
+                </a:cxnLst>
+                <a:rect l="l" t="t" r="r" b="b"/>
+                <a:pathLst>
+                  <a:path w="263060" h="320997">
+                    <a:moveTo>
+                      <a:pt x="0" y="320997"/>
+                    </a:moveTo>
+                    <a:lnTo>
+                      <a:pt x="143192" y="320997"/>
+                    </a:lnTo>
+                    <a:lnTo>
+                      <a:pt x="166675" y="224469"/>
+                    </a:lnTo>
+                    <a:lnTo>
+                      <a:pt x="167872" y="224760"/>
+                    </a:lnTo>
+                    <a:lnTo>
+                      <a:pt x="167552" y="223402"/>
+                    </a:lnTo>
+                    <a:lnTo>
+                      <a:pt x="263060" y="200938"/>
+                    </a:lnTo>
+                    <a:lnTo>
+                      <a:pt x="263060" y="0"/>
+                    </a:lnTo>
+                    <a:lnTo>
+                      <a:pt x="0" y="0"/>
+                    </a:lnTo>
+                    <a:close/>
+                  </a:path>
+                </a:pathLst>
+              </a:custGeom>
+              <a:solidFill>
+                <a:srgbClr val="0070C0"/>
+              </a:solidFill>
+              <a:ln>
+                <a:noFill/>
+              </a:ln>
+            </p:spPr>
+            <p:style>
+              <a:lnRef idx="2">
+                <a:schemeClr val="accent1"/>
+              </a:lnRef>
+              <a:fillRef idx="1">
+                <a:schemeClr val="lt1"/>
+              </a:fillRef>
+              <a:effectRef idx="0">
+                <a:schemeClr val="accent1"/>
+              </a:effectRef>
+              <a:fontRef idx="minor">
+                <a:schemeClr val="dk1"/>
+              </a:fontRef>
+            </p:style>
+            <p:txBody>
+              <a:bodyPr wrap="square" rtlCol="0" anchor="ctr">
+                <a:noAutofit/>
+              </a:bodyPr>
+              <a:lstStyle/>
+              <a:p>
+                <a:pPr algn="ctr"/>
+                <a:endParaRPr lang="en-US" dirty="0"/>
+              </a:p>
+            </p:txBody>
+          </p:sp>
+          <p:sp>
+            <p:nvSpPr>
+              <p:cNvPr id="157" name="Freeform: Shape 156">
+                <a:extLst>
+                  <a:ext uri="{FF2B5EF4-FFF2-40B4-BE49-F238E27FC236}">
+                    <a16:creationId xmlns:a16="http://schemas.microsoft.com/office/drawing/2014/main" id="{877F9CCE-1CE8-47EA-B437-B5FC528A4A07}"/>
+                  </a:ext>
+                </a:extLst>
+              </p:cNvPr>
+              <p:cNvSpPr/>
+              <p:nvPr/>
+            </p:nvSpPr>
+            <p:spPr>
+              <a:xfrm rot="794163">
+                <a:off x="3078696" y="1809562"/>
+                <a:ext cx="123332" cy="75934"/>
+              </a:xfrm>
+              <a:custGeom>
+                <a:avLst/>
+                <a:gdLst>
+                  <a:gd name="connsiteX0" fmla="*/ 0 w 144316"/>
+                  <a:gd name="connsiteY0" fmla="*/ 0 h 88854"/>
+                  <a:gd name="connsiteX1" fmla="*/ 144288 w 144316"/>
+                  <a:gd name="connsiteY1" fmla="*/ 88733 h 88854"/>
+                  <a:gd name="connsiteX2" fmla="*/ 144316 w 144316"/>
+                  <a:gd name="connsiteY2" fmla="*/ 88854 h 88854"/>
+                  <a:gd name="connsiteX3" fmla="*/ 45769 w 144316"/>
+                  <a:gd name="connsiteY3" fmla="*/ 88854 h 88854"/>
+                  <a:gd name="connsiteX4" fmla="*/ 45769 w 144316"/>
+                  <a:gd name="connsiteY4" fmla="*/ 87459 h 88854"/>
+                  <a:gd name="connsiteX5" fmla="*/ 44671 w 144316"/>
+                  <a:gd name="connsiteY5" fmla="*/ 88016 h 88854"/>
+                </a:gdLst>
+                <a:ahLst/>
+                <a:cxnLst>
+                  <a:cxn ang="0">
+                    <a:pos x="connsiteX0" y="connsiteY0"/>
+                  </a:cxn>
+                  <a:cxn ang="0">
+                    <a:pos x="connsiteX1" y="connsiteY1"/>
+                  </a:cxn>
+                  <a:cxn ang="0">
+                    <a:pos x="connsiteX2" y="connsiteY2"/>
+                  </a:cxn>
+                  <a:cxn ang="0">
+                    <a:pos x="connsiteX3" y="connsiteY3"/>
+                  </a:cxn>
+                  <a:cxn ang="0">
+                    <a:pos x="connsiteX4" y="connsiteY4"/>
+                  </a:cxn>
+                  <a:cxn ang="0">
+                    <a:pos x="connsiteX5" y="connsiteY5"/>
+                  </a:cxn>
+                </a:cxnLst>
+                <a:rect l="l" t="t" r="r" b="b"/>
+                <a:pathLst>
+                  <a:path w="144316" h="88854">
+                    <a:moveTo>
+                      <a:pt x="0" y="0"/>
+                    </a:moveTo>
+                    <a:lnTo>
+                      <a:pt x="144288" y="88733"/>
+                    </a:lnTo>
+                    <a:lnTo>
+                      <a:pt x="144316" y="88854"/>
+                    </a:lnTo>
+                    <a:lnTo>
+                      <a:pt x="45769" y="88854"/>
+                    </a:lnTo>
+                    <a:lnTo>
+                      <a:pt x="45769" y="87459"/>
+                    </a:lnTo>
+                    <a:lnTo>
+                      <a:pt x="44671" y="88016"/>
+                    </a:lnTo>
+                    <a:close/>
+                  </a:path>
+                </a:pathLst>
+              </a:custGeom>
+              <a:solidFill>
+                <a:srgbClr val="0070C0"/>
+              </a:solidFill>
+              <a:ln>
+                <a:noFill/>
+              </a:ln>
+            </p:spPr>
+            <p:style>
+              <a:lnRef idx="2">
+                <a:schemeClr val="accent1">
+                  <a:shade val="50000"/>
+                </a:schemeClr>
+              </a:lnRef>
+              <a:fillRef idx="1">
+                <a:schemeClr val="accent1"/>
+              </a:fillRef>
+              <a:effectRef idx="0">
+                <a:schemeClr val="accent1"/>
+              </a:effectRef>
+              <a:fontRef idx="minor">
+                <a:schemeClr val="lt1"/>
+              </a:fontRef>
+            </p:style>
+            <p:txBody>
+              <a:bodyPr rtlCol="0" anchor="ctr"/>
+              <a:lstStyle/>
+              <a:p>
+                <a:pPr algn="ctr"/>
+                <a:endParaRPr lang="en-US"/>
+              </a:p>
+            </p:txBody>
+          </p:sp>
+        </p:grpSp>
+      </p:grpSp>
     </p:spTree>
     <p:extLst>
       <p:ext uri="{BB962C8B-B14F-4D97-AF65-F5344CB8AC3E}">

</xml_diff>